<commit_message>
add Mathtype for slides1w
</commit_message>
<xml_diff>
--- a/fall11/slidesF11/slides1w.pptx
+++ b/fall11/slidesF11/slides1w.pptx
@@ -5,10 +5,10 @@
     <p:sldMasterId id="2147483650" r:id="rId1"/>
   </p:sldMasterIdLst>
   <p:notesMasterIdLst>
-    <p:notesMasterId r:id="rId33"/>
+    <p:notesMasterId r:id="rId34"/>
   </p:notesMasterIdLst>
   <p:handoutMasterIdLst>
-    <p:handoutMasterId r:id="rId34"/>
+    <p:handoutMasterId r:id="rId35"/>
   </p:handoutMasterIdLst>
   <p:sldIdLst>
     <p:sldId id="306" r:id="rId2"/>
@@ -27,26 +27,27 @@
     <p:sldId id="309" r:id="rId15"/>
     <p:sldId id="321" r:id="rId16"/>
     <p:sldId id="261" r:id="rId17"/>
-    <p:sldId id="264" r:id="rId18"/>
-    <p:sldId id="286" r:id="rId19"/>
-    <p:sldId id="288" r:id="rId20"/>
-    <p:sldId id="319" r:id="rId21"/>
-    <p:sldId id="320" r:id="rId22"/>
-    <p:sldId id="308" r:id="rId23"/>
-    <p:sldId id="346" r:id="rId24"/>
-    <p:sldId id="345" r:id="rId25"/>
-    <p:sldId id="298" r:id="rId26"/>
-    <p:sldId id="342" r:id="rId27"/>
-    <p:sldId id="289" r:id="rId28"/>
-    <p:sldId id="302" r:id="rId29"/>
-    <p:sldId id="266" r:id="rId30"/>
-    <p:sldId id="339" r:id="rId31"/>
-    <p:sldId id="344" r:id="rId32"/>
+    <p:sldId id="347" r:id="rId18"/>
+    <p:sldId id="264" r:id="rId19"/>
+    <p:sldId id="286" r:id="rId20"/>
+    <p:sldId id="288" r:id="rId21"/>
+    <p:sldId id="319" r:id="rId22"/>
+    <p:sldId id="320" r:id="rId23"/>
+    <p:sldId id="308" r:id="rId24"/>
+    <p:sldId id="346" r:id="rId25"/>
+    <p:sldId id="345" r:id="rId26"/>
+    <p:sldId id="298" r:id="rId27"/>
+    <p:sldId id="342" r:id="rId28"/>
+    <p:sldId id="289" r:id="rId29"/>
+    <p:sldId id="302" r:id="rId30"/>
+    <p:sldId id="266" r:id="rId31"/>
+    <p:sldId id="339" r:id="rId32"/>
+    <p:sldId id="344" r:id="rId33"/>
   </p:sldIdLst>
   <p:sldSz cx="9144000" cy="6858000" type="screen4x3"/>
   <p:notesSz cx="7315200" cy="9601200"/>
   <p:custDataLst>
-    <p:tags r:id="rId36"/>
+    <p:tags r:id="rId37"/>
   </p:custDataLst>
   <p:defaultTextStyle>
     <a:defPPr>
@@ -1487,7 +1488,7 @@
       </p:grpSpPr>
       <p:sp>
         <p:nvSpPr>
-          <p:cNvPr id="62466" name="Rectangle 7"/>
+          <p:cNvPr id="61442" name="Rectangle 7"/>
           <p:cNvSpPr>
             <a:spLocks noGrp="1" noChangeArrowheads="1"/>
           </p:cNvSpPr>
@@ -1502,7 +1503,7 @@
           <a:bodyPr/>
           <a:lstStyle/>
           <a:p>
-            <a:fld id="{015363C2-3A80-4355-B6A5-052F8B41EBE2}" type="slidenum">
+            <a:fld id="{06FD86CA-7308-4060-BA80-6687A7ACAB22}" type="slidenum">
               <a:rPr lang="en-US" smtClean="0"/>
               <a:pPr/>
               <a:t>17</a:t>
@@ -1513,7 +1514,7 @@
       </p:sp>
       <p:sp>
         <p:nvSpPr>
-          <p:cNvPr id="62467" name="Rectangle 2"/>
+          <p:cNvPr id="61443" name="Rectangle 2"/>
           <p:cNvSpPr>
             <a:spLocks noGrp="1" noRot="1" noChangeAspect="1" noChangeArrowheads="1" noTextEdit="1"/>
           </p:cNvSpPr>
@@ -1527,7 +1528,7 @@
       </p:sp>
       <p:sp>
         <p:nvSpPr>
-          <p:cNvPr id="62468" name="Rectangle 3"/>
+          <p:cNvPr id="61444" name="Rectangle 3"/>
           <p:cNvSpPr>
             <a:spLocks noGrp="1" noChangeArrowheads="1"/>
           </p:cNvSpPr>
@@ -1575,7 +1576,7 @@
       </p:grpSpPr>
       <p:sp>
         <p:nvSpPr>
-          <p:cNvPr id="63490" name="Rectangle 7"/>
+          <p:cNvPr id="62466" name="Rectangle 7"/>
           <p:cNvSpPr>
             <a:spLocks noGrp="1" noChangeArrowheads="1"/>
           </p:cNvSpPr>
@@ -1590,7 +1591,7 @@
           <a:bodyPr/>
           <a:lstStyle/>
           <a:p>
-            <a:fld id="{3D443B33-EB85-4A38-BCF8-55D52547317C}" type="slidenum">
+            <a:fld id="{015363C2-3A80-4355-B6A5-052F8B41EBE2}" type="slidenum">
               <a:rPr lang="en-US" smtClean="0"/>
               <a:pPr/>
               <a:t>18</a:t>
@@ -1601,7 +1602,7 @@
       </p:sp>
       <p:sp>
         <p:nvSpPr>
-          <p:cNvPr id="63491" name="Rectangle 2"/>
+          <p:cNvPr id="62467" name="Rectangle 2"/>
           <p:cNvSpPr>
             <a:spLocks noGrp="1" noRot="1" noChangeAspect="1" noChangeArrowheads="1" noTextEdit="1"/>
           </p:cNvSpPr>
@@ -1615,7 +1616,7 @@
       </p:sp>
       <p:sp>
         <p:nvSpPr>
-          <p:cNvPr id="63492" name="Rectangle 3"/>
+          <p:cNvPr id="62468" name="Rectangle 3"/>
           <p:cNvSpPr>
             <a:spLocks noGrp="1" noChangeArrowheads="1"/>
           </p:cNvSpPr>
@@ -1663,7 +1664,7 @@
       </p:grpSpPr>
       <p:sp>
         <p:nvSpPr>
-          <p:cNvPr id="64514" name="Rectangle 7"/>
+          <p:cNvPr id="63490" name="Rectangle 7"/>
           <p:cNvSpPr>
             <a:spLocks noGrp="1" noChangeArrowheads="1"/>
           </p:cNvSpPr>
@@ -1678,7 +1679,7 @@
           <a:bodyPr/>
           <a:lstStyle/>
           <a:p>
-            <a:fld id="{1EF09EF7-8FD4-487F-B1F0-2E54B2078867}" type="slidenum">
+            <a:fld id="{3D443B33-EB85-4A38-BCF8-55D52547317C}" type="slidenum">
               <a:rPr lang="en-US" smtClean="0"/>
               <a:pPr/>
               <a:t>19</a:t>
@@ -1689,7 +1690,7 @@
       </p:sp>
       <p:sp>
         <p:nvSpPr>
-          <p:cNvPr id="64515" name="Rectangle 2"/>
+          <p:cNvPr id="63491" name="Rectangle 2"/>
           <p:cNvSpPr>
             <a:spLocks noGrp="1" noRot="1" noChangeAspect="1" noChangeArrowheads="1" noTextEdit="1"/>
           </p:cNvSpPr>
@@ -1703,7 +1704,7 @@
       </p:sp>
       <p:sp>
         <p:nvSpPr>
-          <p:cNvPr id="64516" name="Rectangle 3"/>
+          <p:cNvPr id="63492" name="Rectangle 3"/>
           <p:cNvSpPr>
             <a:spLocks noGrp="1" noChangeArrowheads="1"/>
           </p:cNvSpPr>
@@ -1751,7 +1752,7 @@
       </p:grpSpPr>
       <p:sp>
         <p:nvSpPr>
-          <p:cNvPr id="65538" name="Rectangle 7"/>
+          <p:cNvPr id="64514" name="Rectangle 7"/>
           <p:cNvSpPr>
             <a:spLocks noGrp="1" noChangeArrowheads="1"/>
           </p:cNvSpPr>
@@ -1766,7 +1767,7 @@
           <a:bodyPr/>
           <a:lstStyle/>
           <a:p>
-            <a:fld id="{61C0D827-3B30-41B3-844D-02406EF0DDDE}" type="slidenum">
+            <a:fld id="{1EF09EF7-8FD4-487F-B1F0-2E54B2078867}" type="slidenum">
               <a:rPr lang="en-US" smtClean="0"/>
               <a:pPr/>
               <a:t>20</a:t>
@@ -1777,7 +1778,7 @@
       </p:sp>
       <p:sp>
         <p:nvSpPr>
-          <p:cNvPr id="65539" name="Rectangle 2"/>
+          <p:cNvPr id="64515" name="Rectangle 2"/>
           <p:cNvSpPr>
             <a:spLocks noGrp="1" noRot="1" noChangeAspect="1" noChangeArrowheads="1" noTextEdit="1"/>
           </p:cNvSpPr>
@@ -1791,7 +1792,7 @@
       </p:sp>
       <p:sp>
         <p:nvSpPr>
-          <p:cNvPr id="65540" name="Rectangle 3"/>
+          <p:cNvPr id="64516" name="Rectangle 3"/>
           <p:cNvSpPr>
             <a:spLocks noGrp="1" noChangeArrowheads="1"/>
           </p:cNvSpPr>
@@ -1927,7 +1928,7 @@
       </p:grpSpPr>
       <p:sp>
         <p:nvSpPr>
-          <p:cNvPr id="66562" name="Rectangle 7"/>
+          <p:cNvPr id="65538" name="Rectangle 7"/>
           <p:cNvSpPr>
             <a:spLocks noGrp="1" noChangeArrowheads="1"/>
           </p:cNvSpPr>
@@ -1942,7 +1943,7 @@
           <a:bodyPr/>
           <a:lstStyle/>
           <a:p>
-            <a:fld id="{7ADFF96C-1126-4FE2-8812-2235E28F31C8}" type="slidenum">
+            <a:fld id="{61C0D827-3B30-41B3-844D-02406EF0DDDE}" type="slidenum">
               <a:rPr lang="en-US" smtClean="0"/>
               <a:pPr/>
               <a:t>21</a:t>
@@ -1953,7 +1954,7 @@
       </p:sp>
       <p:sp>
         <p:nvSpPr>
-          <p:cNvPr id="66563" name="Rectangle 2"/>
+          <p:cNvPr id="65539" name="Rectangle 2"/>
           <p:cNvSpPr>
             <a:spLocks noGrp="1" noRot="1" noChangeAspect="1" noChangeArrowheads="1" noTextEdit="1"/>
           </p:cNvSpPr>
@@ -1967,7 +1968,7 @@
       </p:sp>
       <p:sp>
         <p:nvSpPr>
-          <p:cNvPr id="66564" name="Rectangle 3"/>
+          <p:cNvPr id="65540" name="Rectangle 3"/>
           <p:cNvSpPr>
             <a:spLocks noGrp="1" noChangeArrowheads="1"/>
           </p:cNvSpPr>
@@ -2015,7 +2016,7 @@
       </p:grpSpPr>
       <p:sp>
         <p:nvSpPr>
-          <p:cNvPr id="67586" name="Rectangle 7"/>
+          <p:cNvPr id="66562" name="Rectangle 7"/>
           <p:cNvSpPr>
             <a:spLocks noGrp="1" noChangeArrowheads="1"/>
           </p:cNvSpPr>
@@ -2030,7 +2031,7 @@
           <a:bodyPr/>
           <a:lstStyle/>
           <a:p>
-            <a:fld id="{E1AB1F72-E3CC-4931-BF03-3C0BE4D7A4E3}" type="slidenum">
+            <a:fld id="{7ADFF96C-1126-4FE2-8812-2235E28F31C8}" type="slidenum">
               <a:rPr lang="en-US" smtClean="0"/>
               <a:pPr/>
               <a:t>22</a:t>
@@ -2041,7 +2042,7 @@
       </p:sp>
       <p:sp>
         <p:nvSpPr>
-          <p:cNvPr id="67587" name="Rectangle 2"/>
+          <p:cNvPr id="66563" name="Rectangle 2"/>
           <p:cNvSpPr>
             <a:spLocks noGrp="1" noRot="1" noChangeAspect="1" noChangeArrowheads="1" noTextEdit="1"/>
           </p:cNvSpPr>
@@ -2055,7 +2056,7 @@
       </p:sp>
       <p:sp>
         <p:nvSpPr>
-          <p:cNvPr id="67588" name="Rectangle 3"/>
+          <p:cNvPr id="66564" name="Rectangle 3"/>
           <p:cNvSpPr>
             <a:spLocks noGrp="1" noChangeArrowheads="1"/>
           </p:cNvSpPr>
@@ -2103,7 +2104,7 @@
       </p:grpSpPr>
       <p:sp>
         <p:nvSpPr>
-          <p:cNvPr id="68610" name="Rectangle 7"/>
+          <p:cNvPr id="67586" name="Rectangle 7"/>
           <p:cNvSpPr>
             <a:spLocks noGrp="1" noChangeArrowheads="1"/>
           </p:cNvSpPr>
@@ -2118,10 +2119,10 @@
           <a:bodyPr/>
           <a:lstStyle/>
           <a:p>
-            <a:fld id="{AB383728-4ACD-45AA-AE8F-C481528D9881}" type="slidenum">
+            <a:fld id="{E1AB1F72-E3CC-4931-BF03-3C0BE4D7A4E3}" type="slidenum">
               <a:rPr lang="en-US" smtClean="0"/>
               <a:pPr/>
-              <a:t>25</a:t>
+              <a:t>23</a:t>
             </a:fld>
             <a:endParaRPr lang="en-US" smtClean="0"/>
           </a:p>
@@ -2129,7 +2130,7 @@
       </p:sp>
       <p:sp>
         <p:nvSpPr>
-          <p:cNvPr id="68611" name="Rectangle 2"/>
+          <p:cNvPr id="67587" name="Rectangle 2"/>
           <p:cNvSpPr>
             <a:spLocks noGrp="1" noRot="1" noChangeAspect="1" noChangeArrowheads="1" noTextEdit="1"/>
           </p:cNvSpPr>
@@ -2143,7 +2144,7 @@
       </p:sp>
       <p:sp>
         <p:nvSpPr>
-          <p:cNvPr id="68612" name="Rectangle 3"/>
+          <p:cNvPr id="67588" name="Rectangle 3"/>
           <p:cNvSpPr>
             <a:spLocks noGrp="1" noChangeArrowheads="1"/>
           </p:cNvSpPr>
@@ -2191,7 +2192,7 @@
       </p:grpSpPr>
       <p:sp>
         <p:nvSpPr>
-          <p:cNvPr id="69634" name="Rectangle 7"/>
+          <p:cNvPr id="68610" name="Rectangle 7"/>
           <p:cNvSpPr>
             <a:spLocks noGrp="1" noChangeArrowheads="1"/>
           </p:cNvSpPr>
@@ -2206,7 +2207,7 @@
           <a:bodyPr/>
           <a:lstStyle/>
           <a:p>
-            <a:fld id="{37E283DA-5899-48F3-84C6-6483C00AB4A7}" type="slidenum">
+            <a:fld id="{AB383728-4ACD-45AA-AE8F-C481528D9881}" type="slidenum">
               <a:rPr lang="en-US" smtClean="0"/>
               <a:pPr/>
               <a:t>26</a:t>
@@ -2217,7 +2218,7 @@
       </p:sp>
       <p:sp>
         <p:nvSpPr>
-          <p:cNvPr id="69635" name="Rectangle 2"/>
+          <p:cNvPr id="68611" name="Rectangle 2"/>
           <p:cNvSpPr>
             <a:spLocks noGrp="1" noRot="1" noChangeAspect="1" noChangeArrowheads="1" noTextEdit="1"/>
           </p:cNvSpPr>
@@ -2231,7 +2232,7 @@
       </p:sp>
       <p:sp>
         <p:nvSpPr>
-          <p:cNvPr id="69636" name="Rectangle 3"/>
+          <p:cNvPr id="68612" name="Rectangle 3"/>
           <p:cNvSpPr>
             <a:spLocks noGrp="1" noChangeArrowheads="1"/>
           </p:cNvSpPr>
@@ -2367,7 +2368,7 @@
       </p:grpSpPr>
       <p:sp>
         <p:nvSpPr>
-          <p:cNvPr id="70658" name="Rectangle 7"/>
+          <p:cNvPr id="69634" name="Rectangle 7"/>
           <p:cNvSpPr>
             <a:spLocks noGrp="1" noChangeArrowheads="1"/>
           </p:cNvSpPr>
@@ -2382,7 +2383,7 @@
           <a:bodyPr/>
           <a:lstStyle/>
           <a:p>
-            <a:fld id="{8E7D3159-B9DE-441B-A62B-B74582C5B49E}" type="slidenum">
+            <a:fld id="{37E283DA-5899-48F3-84C6-6483C00AB4A7}" type="slidenum">
               <a:rPr lang="en-US" smtClean="0"/>
               <a:pPr/>
               <a:t>28</a:t>
@@ -2393,7 +2394,7 @@
       </p:sp>
       <p:sp>
         <p:nvSpPr>
-          <p:cNvPr id="70659" name="Rectangle 2"/>
+          <p:cNvPr id="69635" name="Rectangle 2"/>
           <p:cNvSpPr>
             <a:spLocks noGrp="1" noRot="1" noChangeAspect="1" noChangeArrowheads="1" noTextEdit="1"/>
           </p:cNvSpPr>
@@ -2407,7 +2408,7 @@
       </p:sp>
       <p:sp>
         <p:nvSpPr>
-          <p:cNvPr id="70660" name="Rectangle 3"/>
+          <p:cNvPr id="69636" name="Rectangle 3"/>
           <p:cNvSpPr>
             <a:spLocks noGrp="1" noChangeArrowheads="1"/>
           </p:cNvSpPr>
@@ -2455,7 +2456,7 @@
       </p:grpSpPr>
       <p:sp>
         <p:nvSpPr>
-          <p:cNvPr id="71682" name="Rectangle 7"/>
+          <p:cNvPr id="70658" name="Rectangle 7"/>
           <p:cNvSpPr>
             <a:spLocks noGrp="1" noChangeArrowheads="1"/>
           </p:cNvSpPr>
@@ -2470,7 +2471,7 @@
           <a:bodyPr/>
           <a:lstStyle/>
           <a:p>
-            <a:fld id="{20F44D78-E584-4667-AD79-A0C4664A329D}" type="slidenum">
+            <a:fld id="{8E7D3159-B9DE-441B-A62B-B74582C5B49E}" type="slidenum">
               <a:rPr lang="en-US" smtClean="0"/>
               <a:pPr/>
               <a:t>29</a:t>
@@ -2481,7 +2482,7 @@
       </p:sp>
       <p:sp>
         <p:nvSpPr>
-          <p:cNvPr id="71683" name="Rectangle 2"/>
+          <p:cNvPr id="70659" name="Rectangle 2"/>
           <p:cNvSpPr>
             <a:spLocks noGrp="1" noRot="1" noChangeAspect="1" noChangeArrowheads="1" noTextEdit="1"/>
           </p:cNvSpPr>
@@ -2495,7 +2496,7 @@
       </p:sp>
       <p:sp>
         <p:nvSpPr>
-          <p:cNvPr id="71684" name="Rectangle 3"/>
+          <p:cNvPr id="70660" name="Rectangle 3"/>
           <p:cNvSpPr>
             <a:spLocks noGrp="1" noChangeArrowheads="1"/>
           </p:cNvSpPr>
@@ -2543,7 +2544,7 @@
       </p:grpSpPr>
       <p:sp>
         <p:nvSpPr>
-          <p:cNvPr id="72706" name="Rectangle 7"/>
+          <p:cNvPr id="71682" name="Rectangle 7"/>
           <p:cNvSpPr>
             <a:spLocks noGrp="1" noChangeArrowheads="1"/>
           </p:cNvSpPr>
@@ -2558,10 +2559,98 @@
           <a:bodyPr/>
           <a:lstStyle/>
           <a:p>
+            <a:fld id="{20F44D78-E584-4667-AD79-A0C4664A329D}" type="slidenum">
+              <a:rPr lang="en-US" smtClean="0"/>
+              <a:pPr/>
+              <a:t>30</a:t>
+            </a:fld>
+            <a:endParaRPr lang="en-US" smtClean="0"/>
+          </a:p>
+        </p:txBody>
+      </p:sp>
+      <p:sp>
+        <p:nvSpPr>
+          <p:cNvPr id="71683" name="Rectangle 2"/>
+          <p:cNvSpPr>
+            <a:spLocks noGrp="1" noRot="1" noChangeAspect="1" noChangeArrowheads="1" noTextEdit="1"/>
+          </p:cNvSpPr>
+          <p:nvPr>
+            <p:ph type="sldImg"/>
+          </p:nvPr>
+        </p:nvSpPr>
+        <p:spPr>
+          <a:ln/>
+        </p:spPr>
+      </p:sp>
+      <p:sp>
+        <p:nvSpPr>
+          <p:cNvPr id="71684" name="Rectangle 3"/>
+          <p:cNvSpPr>
+            <a:spLocks noGrp="1" noChangeArrowheads="1"/>
+          </p:cNvSpPr>
+          <p:nvPr>
+            <p:ph type="body" idx="1"/>
+          </p:nvPr>
+        </p:nvSpPr>
+        <p:spPr>
+          <a:noFill/>
+          <a:ln/>
+        </p:spPr>
+        <p:txBody>
+          <a:bodyPr/>
+          <a:lstStyle/>
+          <a:p>
+            <a:pPr eaLnBrk="1" hangingPunct="1"/>
+            <a:endParaRPr lang="en-US" smtClean="0"/>
+          </a:p>
+        </p:txBody>
+      </p:sp>
+    </p:spTree>
+  </p:cSld>
+  <p:clrMapOvr>
+    <a:masterClrMapping/>
+  </p:clrMapOvr>
+</p:notes>
+</file>
+
+<file path=ppt/notesSlides/notesSlide28.xml><?xml version="1.0" encoding="utf-8"?>
+<p:notes xmlns:a="http://schemas.openxmlformats.org/drawingml/2006/main" xmlns:r="http://schemas.openxmlformats.org/officeDocument/2006/relationships" xmlns:p="http://schemas.openxmlformats.org/presentationml/2006/main">
+  <p:cSld>
+    <p:spTree>
+      <p:nvGrpSpPr>
+        <p:cNvPr id="1" name=""/>
+        <p:cNvGrpSpPr/>
+        <p:nvPr/>
+      </p:nvGrpSpPr>
+      <p:grpSpPr>
+        <a:xfrm>
+          <a:off x="0" y="0"/>
+          <a:ext cx="0" cy="0"/>
+          <a:chOff x="0" y="0"/>
+          <a:chExt cx="0" cy="0"/>
+        </a:xfrm>
+      </p:grpSpPr>
+      <p:sp>
+        <p:nvSpPr>
+          <p:cNvPr id="72706" name="Rectangle 7"/>
+          <p:cNvSpPr>
+            <a:spLocks noGrp="1" noChangeArrowheads="1"/>
+          </p:cNvSpPr>
+          <p:nvPr>
+            <p:ph type="sldNum" sz="quarter" idx="5"/>
+          </p:nvPr>
+        </p:nvSpPr>
+        <p:spPr>
+          <a:noFill/>
+        </p:spPr>
+        <p:txBody>
+          <a:bodyPr/>
+          <a:lstStyle/>
+          <a:p>
             <a:fld id="{FD2190A4-FF02-40A0-8C37-8FAE10CE0E26}" type="slidenum">
               <a:rPr lang="en-US" smtClean="0"/>
               <a:pPr/>
-              <a:t>30</a:t>
+              <a:t>31</a:t>
             </a:fld>
             <a:endParaRPr lang="en-US" smtClean="0"/>
           </a:p>
@@ -6425,7 +6514,7 @@
           <a:graphicData uri="http://schemas.openxmlformats.org/presentationml/2006/ole">
             <mc:AlternateContent xmlns:mc="http://schemas.openxmlformats.org/markup-compatibility/2006">
               <mc:Choice xmlns:v="urn:schemas-microsoft-com:vml" Requires="v">
-                <p:oleObj spid="_x0000_s1052" name="Equation" r:id="rId4" imgW="914400" imgH="215640" progId="Equation.3">
+                <p:oleObj spid="_x0000_s1057" name="Equation" r:id="rId4" imgW="914400" imgH="215640" progId="Equation.3">
                   <p:embed/>
                 </p:oleObj>
               </mc:Choice>
@@ -6495,7 +6584,7 @@
           <a:graphicData uri="http://schemas.openxmlformats.org/presentationml/2006/ole">
             <mc:AlternateContent xmlns:mc="http://schemas.openxmlformats.org/markup-compatibility/2006">
               <mc:Choice xmlns:v="urn:schemas-microsoft-com:vml" Requires="v">
-                <p:oleObj spid="_x0000_s1053" name="Equation" r:id="rId6" imgW="914400" imgH="215640" progId="Equation.3">
+                <p:oleObj spid="_x0000_s1058" name="Equation" r:id="rId6" imgW="914400" imgH="215640" progId="Equation.3">
                   <p:embed/>
                 </p:oleObj>
               </mc:Choice>
@@ -7387,7 +7476,7 @@
           <a:graphicData uri="http://schemas.openxmlformats.org/presentationml/2006/ole">
             <mc:AlternateContent xmlns:mc="http://schemas.openxmlformats.org/markup-compatibility/2006">
               <mc:Choice xmlns:v="urn:schemas-microsoft-com:vml" Requires="v">
-                <p:oleObj spid="_x0000_s150545" name="Equation" r:id="rId4" imgW="838200" imgH="241300" progId="Equation.DSMT4">
+                <p:oleObj spid="_x0000_s150548" name="Equation" r:id="rId4" imgW="838200" imgH="241300" progId="Equation.DSMT4">
                   <p:embed/>
                 </p:oleObj>
               </mc:Choice>
@@ -8300,7 +8389,7 @@
           <a:graphicData uri="http://schemas.openxmlformats.org/presentationml/2006/ole">
             <mc:AlternateContent xmlns:mc="http://schemas.openxmlformats.org/markup-compatibility/2006">
               <mc:Choice xmlns:v="urn:schemas-microsoft-com:vml" Requires="v">
-                <p:oleObj spid="_x0000_s6171" name="Equation" r:id="rId4" imgW="304560" imgH="139680" progId="Equation.DSMT4">
+                <p:oleObj spid="_x0000_s6176" name="Equation" r:id="rId4" imgW="304560" imgH="139680" progId="Equation.DSMT4">
                   <p:embed/>
                 </p:oleObj>
               </mc:Choice>
@@ -8370,7 +8459,7 @@
           <a:graphicData uri="http://schemas.openxmlformats.org/presentationml/2006/ole">
             <mc:AlternateContent xmlns:mc="http://schemas.openxmlformats.org/markup-compatibility/2006">
               <mc:Choice xmlns:v="urn:schemas-microsoft-com:vml" Requires="v">
-                <p:oleObj spid="_x0000_s6172" name="Equation" r:id="rId6" imgW="304560" imgH="139680" progId="Equation.DSMT4">
+                <p:oleObj spid="_x0000_s6177" name="Equation" r:id="rId6" imgW="304560" imgH="139680" progId="Equation.DSMT4">
                   <p:embed/>
                 </p:oleObj>
               </mc:Choice>
@@ -9670,7 +9759,7 @@
           <a:graphicData uri="http://schemas.openxmlformats.org/presentationml/2006/ole">
             <mc:AlternateContent xmlns:mc="http://schemas.openxmlformats.org/markup-compatibility/2006">
               <mc:Choice xmlns:v="urn:schemas-microsoft-com:vml" Requires="v">
-                <p:oleObj spid="_x0000_s7195" name="Equation" r:id="rId4" imgW="304560" imgH="139680" progId="Equation.DSMT4">
+                <p:oleObj spid="_x0000_s7200" name="Equation" r:id="rId4" imgW="304560" imgH="139680" progId="Equation.DSMT4">
                   <p:embed/>
                 </p:oleObj>
               </mc:Choice>
@@ -9740,7 +9829,7 @@
           <a:graphicData uri="http://schemas.openxmlformats.org/presentationml/2006/ole">
             <mc:AlternateContent xmlns:mc="http://schemas.openxmlformats.org/markup-compatibility/2006">
               <mc:Choice xmlns:v="urn:schemas-microsoft-com:vml" Requires="v">
-                <p:oleObj spid="_x0000_s7196" name="Equation" r:id="rId6" imgW="304560" imgH="139680" progId="Equation.DSMT4">
+                <p:oleObj spid="_x0000_s7201" name="Equation" r:id="rId6" imgW="304560" imgH="139680" progId="Equation.DSMT4">
                   <p:embed/>
                 </p:oleObj>
               </mc:Choice>
@@ -10141,7 +10230,7 @@
           <a:graphicData uri="http://schemas.openxmlformats.org/presentationml/2006/ole">
             <mc:AlternateContent xmlns:mc="http://schemas.openxmlformats.org/markup-compatibility/2006">
               <mc:Choice xmlns:v="urn:schemas-microsoft-com:vml" Requires="v">
-                <p:oleObj spid="_x0000_s8224" name="Equation" r:id="rId4" imgW="114120" imgH="177480" progId="Equation.DSMT4">
+                <p:oleObj spid="_x0000_s8232" name="Equation" r:id="rId4" imgW="114120" imgH="177480" progId="Equation.DSMT4">
                   <p:embed/>
                 </p:oleObj>
               </mc:Choice>
@@ -10604,41 +10693,6 @@
       </p:sp>
       <p:sp>
         <p:nvSpPr>
-          <p:cNvPr id="8209" name="Line 132"/>
-          <p:cNvSpPr>
-            <a:spLocks noChangeShapeType="1"/>
-          </p:cNvSpPr>
-          <p:nvPr/>
-        </p:nvSpPr>
-        <p:spPr bwMode="auto">
-          <a:xfrm flipV="1">
-            <a:off x="3951288" y="1928813"/>
-            <a:ext cx="0" cy="1503362"/>
-          </a:xfrm>
-          <a:prstGeom prst="line">
-            <a:avLst/>
-          </a:prstGeom>
-          <a:noFill/>
-          <a:ln w="38100">
-            <a:solidFill>
-              <a:schemeClr val="tx1"/>
-            </a:solidFill>
-            <a:prstDash val="sysDot"/>
-            <a:round/>
-            <a:headEnd/>
-            <a:tailEnd type="none" w="lg" len="lg"/>
-          </a:ln>
-        </p:spPr>
-        <p:txBody>
-          <a:bodyPr/>
-          <a:lstStyle/>
-          <a:p>
-            <a:endParaRPr lang="en-US"/>
-          </a:p>
-        </p:txBody>
-      </p:sp>
-      <p:sp>
-        <p:nvSpPr>
           <p:cNvPr id="8210" name="Rectangle 133"/>
           <p:cNvSpPr>
             <a:spLocks noChangeArrowheads="1"/>
@@ -10807,25 +10861,25 @@
           <p:nvPr>
             <p:extLst>
               <p:ext uri="{D42A27DB-BD31-4B8C-83A1-F6EECF244321}">
-                <p14:modId xmlns:p14="http://schemas.microsoft.com/office/powerpoint/2010/main" val="1425908674"/>
+                <p14:modId xmlns:p14="http://schemas.microsoft.com/office/powerpoint/2010/main" val="249181631"/>
               </p:ext>
             </p:extLst>
           </p:nvPr>
         </p:nvGraphicFramePr>
         <p:xfrm>
-          <a:off x="3867006" y="3979286"/>
-          <a:ext cx="2800589" cy="1562532"/>
+          <a:off x="3902075" y="3500438"/>
+          <a:ext cx="2806700" cy="2074862"/>
         </p:xfrm>
         <a:graphic>
           <a:graphicData uri="http://schemas.openxmlformats.org/presentationml/2006/ole">
             <mc:AlternateContent xmlns:mc="http://schemas.openxmlformats.org/markup-compatibility/2006">
               <mc:Choice xmlns:v="urn:schemas-microsoft-com:vml" Requires="v">
-                <p:oleObj spid="_x0000_s8225" name="Equation" r:id="rId6" imgW="660400" imgH="368300" progId="Equation.3">
+                <p:oleObj spid="_x0000_s8233" name="Equation" r:id="rId6" imgW="635000" imgH="469900" progId="Equation.DSMT4">
                   <p:embed/>
                 </p:oleObj>
               </mc:Choice>
               <mc:Fallback>
-                <p:oleObj name="Equation" r:id="rId6" imgW="660400" imgH="368300" progId="Equation.3">
+                <p:oleObj name="Equation" r:id="rId6" imgW="635000" imgH="469900" progId="Equation.DSMT4">
                   <p:embed/>
                   <p:pic>
                     <p:nvPicPr>
@@ -10841,8 +10895,8 @@
                     </p:blipFill>
                     <p:spPr>
                       <a:xfrm>
-                        <a:off x="3867006" y="3979286"/>
-                        <a:ext cx="2800589" cy="1562532"/>
+                        <a:off x="3902075" y="3500438"/>
+                        <a:ext cx="2806700" cy="2074862"/>
                       </a:xfrm>
                       <a:prstGeom prst="rect">
                         <a:avLst/>
@@ -10909,9 +10963,928 @@
                                     </p:set>
                                     <p:animEffect transition="in" filter="wipe(up)">
                                       <p:cBhvr>
-                                        <p:cTn id="7" dur="500"/>
+                                        <p:cTn id="7" dur="1000"/>
                                         <p:tgtEl>
                                           <p:spTgt spid="5"/>
+                                        </p:tgtEl>
+                                      </p:cBhvr>
+                                    </p:animEffect>
+                                  </p:childTnLst>
+                                </p:cTn>
+                              </p:par>
+                            </p:childTnLst>
+                          </p:cTn>
+                        </p:par>
+                      </p:childTnLst>
+                    </p:cTn>
+                  </p:par>
+                </p:childTnLst>
+              </p:cTn>
+              <p:prevCondLst>
+                <p:cond evt="onPrev" delay="0">
+                  <p:tgtEl>
+                    <p:sldTgt/>
+                  </p:tgtEl>
+                </p:cond>
+              </p:prevCondLst>
+              <p:nextCondLst>
+                <p:cond evt="onNext" delay="0">
+                  <p:tgtEl>
+                    <p:sldTgt/>
+                  </p:tgtEl>
+                </p:cond>
+              </p:nextCondLst>
+            </p:seq>
+          </p:childTnLst>
+        </p:cTn>
+      </p:par>
+    </p:tnLst>
+  </p:timing>
+</p:sld>
+</file>
+
+<file path=ppt/slides/slide17.xml><?xml version="1.0" encoding="utf-8"?>
+<p:sld xmlns:a="http://schemas.openxmlformats.org/drawingml/2006/main" xmlns:r="http://schemas.openxmlformats.org/officeDocument/2006/relationships" xmlns:p="http://schemas.openxmlformats.org/presentationml/2006/main">
+  <p:cSld>
+    <p:spTree>
+      <p:nvGrpSpPr>
+        <p:cNvPr id="1" name=""/>
+        <p:cNvGrpSpPr/>
+        <p:nvPr/>
+      </p:nvGrpSpPr>
+      <p:grpSpPr>
+        <a:xfrm>
+          <a:off x="0" y="0"/>
+          <a:ext cx="0" cy="0"/>
+          <a:chOff x="0" y="0"/>
+          <a:chExt cx="0" cy="0"/>
+        </a:xfrm>
+      </p:grpSpPr>
+      <p:sp>
+        <p:nvSpPr>
+          <p:cNvPr id="8196" name="Slide Number Placeholder 3"/>
+          <p:cNvSpPr>
+            <a:spLocks noGrp="1"/>
+          </p:cNvSpPr>
+          <p:nvPr>
+            <p:ph type="sldNum" sz="quarter" idx="10"/>
+          </p:nvPr>
+        </p:nvSpPr>
+        <p:spPr>
+          <a:xfrm>
+            <a:off x="7959725" y="6553200"/>
+            <a:ext cx="1184275" cy="307975"/>
+          </a:xfrm>
+          <a:noFill/>
+        </p:spPr>
+        <p:txBody>
+          <a:bodyPr/>
+          <a:lstStyle/>
+          <a:p>
+            <a:r>
+              <a:rPr lang="en-US" smtClean="0"/>
+              <a:t>      </a:t>
+            </a:r>
+            <a:r>
+              <a:rPr lang="en-US" sz="1200" smtClean="0"/>
+              <a:t>lec 1W.</a:t>
+            </a:r>
+            <a:fld id="{90D7F182-AFDA-4334-AFA0-35192557D391}" type="slidenum">
+              <a:rPr lang="en-US" sz="1200" smtClean="0"/>
+              <a:pPr/>
+              <a:t>17</a:t>
+            </a:fld>
+            <a:endParaRPr lang="en-US" sz="1200" smtClean="0"/>
+          </a:p>
+        </p:txBody>
+      </p:sp>
+      <p:sp>
+        <p:nvSpPr>
+          <p:cNvPr id="8197" name="Rectangle 2"/>
+          <p:cNvSpPr>
+            <a:spLocks noGrp="1" noChangeArrowheads="1"/>
+          </p:cNvSpPr>
+          <p:nvPr>
+            <p:ph type="title"/>
+          </p:nvPr>
+        </p:nvSpPr>
+        <p:spPr/>
+        <p:txBody>
+          <a:bodyPr/>
+          <a:lstStyle/>
+          <a:p>
+            <a:pPr eaLnBrk="1" hangingPunct="1"/>
+            <a:r>
+              <a:rPr lang="en-US" smtClean="0"/>
+              <a:t>A Cool Proof</a:t>
+            </a:r>
+          </a:p>
+        </p:txBody>
+      </p:sp>
+      <p:graphicFrame>
+        <p:nvGraphicFramePr>
+          <p:cNvPr id="8194" name="Object 134"/>
+          <p:cNvGraphicFramePr>
+            <a:graphicFrameLocks noChangeAspect="1"/>
+          </p:cNvGraphicFramePr>
+          <p:nvPr/>
+        </p:nvGraphicFramePr>
+        <p:xfrm>
+          <a:off x="400050" y="9525"/>
+          <a:ext cx="114300" cy="177800"/>
+        </p:xfrm>
+        <a:graphic>
+          <a:graphicData uri="http://schemas.openxmlformats.org/presentationml/2006/ole">
+            <mc:AlternateContent xmlns:mc="http://schemas.openxmlformats.org/markup-compatibility/2006">
+              <mc:Choice xmlns:v="urn:schemas-microsoft-com:vml" Requires="v">
+                <p:oleObj spid="_x0000_s187396" name="Equation" r:id="rId4" imgW="114120" imgH="177480" progId="Equation.DSMT4">
+                  <p:embed/>
+                </p:oleObj>
+              </mc:Choice>
+              <mc:Fallback>
+                <p:oleObj name="Equation" r:id="rId4" imgW="114120" imgH="177480" progId="Equation.DSMT4">
+                  <p:embed/>
+                  <p:pic>
+                    <p:nvPicPr>
+                      <p:cNvPr id="0" name=""/>
+                      <p:cNvPicPr>
+                        <a:picLocks noChangeAspect="1" noChangeArrowheads="1"/>
+                      </p:cNvPicPr>
+                      <p:nvPr/>
+                    </p:nvPicPr>
+                    <p:blipFill>
+                      <a:blip r:embed="rId5">
+                        <a:extLst>
+                          <a:ext uri="{28A0092B-C50C-407E-A947-70E740481C1C}">
+                            <a14:useLocalDpi xmlns:a14="http://schemas.microsoft.com/office/drawing/2010/main" val="0"/>
+                          </a:ext>
+                        </a:extLst>
+                      </a:blip>
+                      <a:srcRect/>
+                      <a:stretch>
+                        <a:fillRect/>
+                      </a:stretch>
+                    </p:blipFill>
+                    <p:spPr bwMode="auto">
+                      <a:xfrm>
+                        <a:off x="400050" y="9525"/>
+                        <a:ext cx="114300" cy="177800"/>
+                      </a:xfrm>
+                      <a:prstGeom prst="rect">
+                        <a:avLst/>
+                      </a:prstGeom>
+                      <a:noFill/>
+                      <a:extLst>
+                        <a:ext uri="{909E8E84-426E-40dd-AFC4-6F175D3DCCD1}">
+                          <a14:hiddenFill xmlns:a14="http://schemas.microsoft.com/office/drawing/2010/main">
+                            <a:solidFill>
+                              <a:srgbClr val="FFFFFF"/>
+                            </a:solidFill>
+                          </a14:hiddenFill>
+                        </a:ext>
+                      </a:extLst>
+                    </p:spPr>
+                  </p:pic>
+                </p:oleObj>
+              </mc:Fallback>
+            </mc:AlternateContent>
+          </a:graphicData>
+        </a:graphic>
+      </p:graphicFrame>
+      <p:sp>
+        <p:nvSpPr>
+          <p:cNvPr id="8198" name="AutoShape 76"/>
+          <p:cNvSpPr>
+            <a:spLocks noChangeArrowheads="1"/>
+          </p:cNvSpPr>
+          <p:nvPr/>
+        </p:nvSpPr>
+        <p:spPr bwMode="auto">
+          <a:xfrm>
+            <a:off x="5065713" y="1928813"/>
+            <a:ext cx="1519237" cy="2606675"/>
+          </a:xfrm>
+          <a:prstGeom prst="rtTriangle">
+            <a:avLst/>
+          </a:prstGeom>
+          <a:solidFill>
+            <a:schemeClr val="bg2"/>
+          </a:solidFill>
+          <a:ln w="9525">
+            <a:solidFill>
+              <a:schemeClr val="tx1"/>
+            </a:solidFill>
+            <a:miter lim="800000"/>
+            <a:headEnd/>
+            <a:tailEnd/>
+          </a:ln>
+        </p:spPr>
+        <p:txBody>
+          <a:bodyPr wrap="none" anchor="ctr"/>
+          <a:lstStyle/>
+          <a:p>
+            <a:endParaRPr lang="en-US">
+              <a:latin typeface="Comic Sans MS" pitchFamily="66" charset="0"/>
+            </a:endParaRPr>
+          </a:p>
+        </p:txBody>
+      </p:sp>
+      <p:sp>
+        <p:nvSpPr>
+          <p:cNvPr id="8199" name="AutoShape 77"/>
+          <p:cNvSpPr>
+            <a:spLocks noChangeArrowheads="1"/>
+          </p:cNvSpPr>
+          <p:nvPr/>
+        </p:nvSpPr>
+        <p:spPr bwMode="auto">
+          <a:xfrm rot="10800000">
+            <a:off x="5065713" y="1928813"/>
+            <a:ext cx="1519237" cy="2606675"/>
+          </a:xfrm>
+          <a:prstGeom prst="rtTriangle">
+            <a:avLst/>
+          </a:prstGeom>
+          <a:solidFill>
+            <a:schemeClr val="accent2"/>
+          </a:solidFill>
+          <a:ln w="9525">
+            <a:solidFill>
+              <a:schemeClr val="tx1"/>
+            </a:solidFill>
+            <a:miter lim="800000"/>
+            <a:headEnd/>
+            <a:tailEnd/>
+          </a:ln>
+        </p:spPr>
+        <p:txBody>
+          <a:bodyPr wrap="none" anchor="ctr"/>
+          <a:lstStyle/>
+          <a:p>
+            <a:endParaRPr lang="en-US">
+              <a:latin typeface="Comic Sans MS" pitchFamily="66" charset="0"/>
+            </a:endParaRPr>
+          </a:p>
+        </p:txBody>
+      </p:sp>
+      <p:sp>
+        <p:nvSpPr>
+          <p:cNvPr id="8200" name="AutoShape 78"/>
+          <p:cNvSpPr>
+            <a:spLocks noChangeArrowheads="1"/>
+          </p:cNvSpPr>
+          <p:nvPr/>
+        </p:nvSpPr>
+        <p:spPr bwMode="auto">
+          <a:xfrm rot="-5400000">
+            <a:off x="2996407" y="1362869"/>
+            <a:ext cx="1503362" cy="2635250"/>
+          </a:xfrm>
+          <a:prstGeom prst="rtTriangle">
+            <a:avLst/>
+          </a:prstGeom>
+          <a:solidFill>
+            <a:schemeClr val="folHlink"/>
+          </a:solidFill>
+          <a:ln w="9525">
+            <a:solidFill>
+              <a:schemeClr val="tx1"/>
+            </a:solidFill>
+            <a:miter lim="800000"/>
+            <a:headEnd/>
+            <a:tailEnd/>
+          </a:ln>
+        </p:spPr>
+        <p:txBody>
+          <a:bodyPr wrap="none" anchor="ctr"/>
+          <a:lstStyle/>
+          <a:p>
+            <a:endParaRPr lang="en-US">
+              <a:latin typeface="Comic Sans MS" pitchFamily="66" charset="0"/>
+            </a:endParaRPr>
+          </a:p>
+        </p:txBody>
+      </p:sp>
+      <p:sp>
+        <p:nvSpPr>
+          <p:cNvPr id="8201" name="AutoShape 79"/>
+          <p:cNvSpPr>
+            <a:spLocks noChangeArrowheads="1"/>
+          </p:cNvSpPr>
+          <p:nvPr/>
+        </p:nvSpPr>
+        <p:spPr bwMode="auto">
+          <a:xfrm rot="5400000">
+            <a:off x="2996407" y="1362869"/>
+            <a:ext cx="1503362" cy="2635250"/>
+          </a:xfrm>
+          <a:prstGeom prst="rtTriangle">
+            <a:avLst/>
+          </a:prstGeom>
+          <a:solidFill>
+            <a:srgbClr val="DDDDDD">
+              <a:alpha val="89803"/>
+            </a:srgbClr>
+          </a:solidFill>
+          <a:ln w="9525">
+            <a:solidFill>
+              <a:schemeClr val="tx1"/>
+            </a:solidFill>
+            <a:miter lim="800000"/>
+            <a:headEnd/>
+            <a:tailEnd/>
+          </a:ln>
+        </p:spPr>
+        <p:txBody>
+          <a:bodyPr wrap="none" anchor="ctr"/>
+          <a:lstStyle/>
+          <a:p>
+            <a:endParaRPr lang="en-US">
+              <a:latin typeface="Comic Sans MS" pitchFamily="66" charset="0"/>
+            </a:endParaRPr>
+          </a:p>
+        </p:txBody>
+      </p:sp>
+      <p:sp>
+        <p:nvSpPr>
+          <p:cNvPr id="8202" name="Line 89"/>
+          <p:cNvSpPr>
+            <a:spLocks noChangeShapeType="1"/>
+          </p:cNvSpPr>
+          <p:nvPr/>
+        </p:nvSpPr>
+        <p:spPr bwMode="auto">
+          <a:xfrm>
+            <a:off x="5470525" y="6338888"/>
+            <a:ext cx="0" cy="0"/>
+          </a:xfrm>
+          <a:prstGeom prst="line">
+            <a:avLst/>
+          </a:prstGeom>
+          <a:noFill/>
+          <a:ln w="9525">
+            <a:solidFill>
+              <a:schemeClr val="tx1"/>
+            </a:solidFill>
+            <a:round/>
+            <a:headEnd/>
+            <a:tailEnd/>
+          </a:ln>
+        </p:spPr>
+        <p:txBody>
+          <a:bodyPr/>
+          <a:lstStyle/>
+          <a:p>
+            <a:endParaRPr lang="en-US"/>
+          </a:p>
+        </p:txBody>
+      </p:sp>
+      <p:sp>
+        <p:nvSpPr>
+          <p:cNvPr id="8203" name="Line 90"/>
+          <p:cNvSpPr>
+            <a:spLocks noChangeShapeType="1"/>
+          </p:cNvSpPr>
+          <p:nvPr/>
+        </p:nvSpPr>
+        <p:spPr bwMode="auto">
+          <a:xfrm>
+            <a:off x="5470525" y="6338888"/>
+            <a:ext cx="0" cy="0"/>
+          </a:xfrm>
+          <a:prstGeom prst="line">
+            <a:avLst/>
+          </a:prstGeom>
+          <a:noFill/>
+          <a:ln w="9525">
+            <a:solidFill>
+              <a:schemeClr val="tx1"/>
+            </a:solidFill>
+            <a:round/>
+            <a:headEnd/>
+            <a:tailEnd/>
+          </a:ln>
+        </p:spPr>
+        <p:txBody>
+          <a:bodyPr/>
+          <a:lstStyle/>
+          <a:p>
+            <a:endParaRPr lang="en-US"/>
+          </a:p>
+        </p:txBody>
+      </p:sp>
+      <p:sp>
+        <p:nvSpPr>
+          <p:cNvPr id="8204" name="Line 103"/>
+          <p:cNvSpPr>
+            <a:spLocks noChangeShapeType="1"/>
+          </p:cNvSpPr>
+          <p:nvPr/>
+        </p:nvSpPr>
+        <p:spPr bwMode="auto">
+          <a:xfrm flipV="1">
+            <a:off x="4051300" y="4535488"/>
+            <a:ext cx="1014413" cy="0"/>
+          </a:xfrm>
+          <a:prstGeom prst="line">
+            <a:avLst/>
+          </a:prstGeom>
+          <a:noFill/>
+          <a:ln w="9525">
+            <a:solidFill>
+              <a:schemeClr val="tx1"/>
+            </a:solidFill>
+            <a:round/>
+            <a:headEnd/>
+            <a:tailEnd/>
+          </a:ln>
+        </p:spPr>
+        <p:txBody>
+          <a:bodyPr/>
+          <a:lstStyle/>
+          <a:p>
+            <a:endParaRPr lang="en-US"/>
+          </a:p>
+        </p:txBody>
+      </p:sp>
+      <p:sp>
+        <p:nvSpPr>
+          <p:cNvPr id="8205" name="Line 104"/>
+          <p:cNvSpPr>
+            <a:spLocks noChangeShapeType="1"/>
+          </p:cNvSpPr>
+          <p:nvPr/>
+        </p:nvSpPr>
+        <p:spPr bwMode="auto">
+          <a:xfrm flipV="1">
+            <a:off x="4051300" y="3432175"/>
+            <a:ext cx="0" cy="1103313"/>
+          </a:xfrm>
+          <a:prstGeom prst="line">
+            <a:avLst/>
+          </a:prstGeom>
+          <a:noFill/>
+          <a:ln w="9525">
+            <a:solidFill>
+              <a:schemeClr val="tx1"/>
+            </a:solidFill>
+            <a:round/>
+            <a:headEnd/>
+            <a:tailEnd/>
+          </a:ln>
+        </p:spPr>
+        <p:txBody>
+          <a:bodyPr/>
+          <a:lstStyle/>
+          <a:p>
+            <a:endParaRPr lang="en-US"/>
+          </a:p>
+        </p:txBody>
+      </p:sp>
+      <p:sp>
+        <p:nvSpPr>
+          <p:cNvPr id="8206" name="Text Box 109"/>
+          <p:cNvSpPr txBox="1">
+            <a:spLocks noChangeArrowheads="1"/>
+          </p:cNvSpPr>
+          <p:nvPr/>
+        </p:nvSpPr>
+        <p:spPr bwMode="auto">
+          <a:xfrm>
+            <a:off x="6584950" y="2930525"/>
+            <a:ext cx="515938" cy="523875"/>
+          </a:xfrm>
+          <a:prstGeom prst="rect">
+            <a:avLst/>
+          </a:prstGeom>
+          <a:noFill/>
+          <a:ln w="9525">
+            <a:noFill/>
+            <a:miter lim="800000"/>
+            <a:headEnd/>
+            <a:tailEnd/>
+          </a:ln>
+        </p:spPr>
+        <p:txBody>
+          <a:bodyPr>
+            <a:spAutoFit/>
+          </a:bodyPr>
+          <a:lstStyle/>
+          <a:p>
+            <a:r>
+              <a:rPr lang="en-US" sz="2800" b="1">
+                <a:latin typeface="Comic Sans MS" pitchFamily="66" charset="0"/>
+              </a:rPr>
+              <a:t>b</a:t>
+            </a:r>
+          </a:p>
+        </p:txBody>
+      </p:sp>
+      <p:sp>
+        <p:nvSpPr>
+          <p:cNvPr id="8207" name="Text Box 129"/>
+          <p:cNvSpPr txBox="1">
+            <a:spLocks noChangeArrowheads="1"/>
+          </p:cNvSpPr>
+          <p:nvPr/>
+        </p:nvSpPr>
+        <p:spPr bwMode="auto">
+          <a:xfrm>
+            <a:off x="1982788" y="2298700"/>
+            <a:ext cx="384175" cy="522288"/>
+          </a:xfrm>
+          <a:prstGeom prst="rect">
+            <a:avLst/>
+          </a:prstGeom>
+          <a:noFill/>
+          <a:ln w="9525">
+            <a:noFill/>
+            <a:miter lim="800000"/>
+            <a:headEnd/>
+            <a:tailEnd type="none" w="lg" len="lg"/>
+          </a:ln>
+        </p:spPr>
+        <p:txBody>
+          <a:bodyPr wrap="none">
+            <a:spAutoFit/>
+          </a:bodyPr>
+          <a:lstStyle/>
+          <a:p>
+            <a:r>
+              <a:rPr lang="en-US" sz="2800" b="1">
+                <a:latin typeface="Comic Sans MS" pitchFamily="66" charset="0"/>
+              </a:rPr>
+              <a:t>a</a:t>
+            </a:r>
+          </a:p>
+        </p:txBody>
+      </p:sp>
+      <p:sp>
+        <p:nvSpPr>
+          <p:cNvPr id="8208" name="Text Box 130"/>
+          <p:cNvSpPr txBox="1">
+            <a:spLocks noChangeArrowheads="1"/>
+          </p:cNvSpPr>
+          <p:nvPr/>
+        </p:nvSpPr>
+        <p:spPr bwMode="auto">
+          <a:xfrm>
+            <a:off x="2995613" y="3300413"/>
+            <a:ext cx="384175" cy="523875"/>
+          </a:xfrm>
+          <a:prstGeom prst="rect">
+            <a:avLst/>
+          </a:prstGeom>
+          <a:noFill/>
+          <a:ln w="9525">
+            <a:noFill/>
+            <a:miter lim="800000"/>
+            <a:headEnd/>
+            <a:tailEnd type="none" w="lg" len="lg"/>
+          </a:ln>
+        </p:spPr>
+        <p:txBody>
+          <a:bodyPr wrap="none">
+            <a:spAutoFit/>
+          </a:bodyPr>
+          <a:lstStyle/>
+          <a:p>
+            <a:r>
+              <a:rPr lang="en-US" sz="2800" b="1">
+                <a:latin typeface="Comic Sans MS" pitchFamily="66" charset="0"/>
+              </a:rPr>
+              <a:t>a</a:t>
+            </a:r>
+          </a:p>
+        </p:txBody>
+      </p:sp>
+      <p:sp>
+        <p:nvSpPr>
+          <p:cNvPr id="8209" name="Line 132"/>
+          <p:cNvSpPr>
+            <a:spLocks noChangeShapeType="1"/>
+          </p:cNvSpPr>
+          <p:nvPr/>
+        </p:nvSpPr>
+        <p:spPr bwMode="auto">
+          <a:xfrm flipV="1">
+            <a:off x="3951288" y="1928813"/>
+            <a:ext cx="0" cy="1503362"/>
+          </a:xfrm>
+          <a:prstGeom prst="line">
+            <a:avLst/>
+          </a:prstGeom>
+          <a:noFill/>
+          <a:ln w="38100">
+            <a:solidFill>
+              <a:schemeClr val="tx1"/>
+            </a:solidFill>
+            <a:prstDash val="sysDot"/>
+            <a:round/>
+            <a:headEnd/>
+            <a:tailEnd type="none" w="lg" len="lg"/>
+          </a:ln>
+        </p:spPr>
+        <p:txBody>
+          <a:bodyPr/>
+          <a:lstStyle/>
+          <a:p>
+            <a:endParaRPr lang="en-US"/>
+          </a:p>
+        </p:txBody>
+      </p:sp>
+      <p:sp>
+        <p:nvSpPr>
+          <p:cNvPr id="8210" name="Rectangle 133"/>
+          <p:cNvSpPr>
+            <a:spLocks noChangeArrowheads="1"/>
+          </p:cNvSpPr>
+          <p:nvPr/>
+        </p:nvSpPr>
+        <p:spPr bwMode="auto">
+          <a:xfrm>
+            <a:off x="3952875" y="3449638"/>
+            <a:ext cx="1093788" cy="1081087"/>
+          </a:xfrm>
+          <a:prstGeom prst="rect">
+            <a:avLst/>
+          </a:prstGeom>
+          <a:solidFill>
+            <a:srgbClr val="FFFF00"/>
+          </a:solidFill>
+          <a:ln w="9525">
+            <a:solidFill>
+              <a:schemeClr val="tx1"/>
+            </a:solidFill>
+            <a:miter lim="800000"/>
+            <a:headEnd/>
+            <a:tailEnd type="none" w="lg" len="lg"/>
+          </a:ln>
+        </p:spPr>
+        <p:txBody>
+          <a:bodyPr wrap="none" anchor="ctr"/>
+          <a:lstStyle/>
+          <a:p>
+            <a:endParaRPr lang="en-US">
+              <a:latin typeface="Comic Sans MS" pitchFamily="66" charset="0"/>
+            </a:endParaRPr>
+          </a:p>
+        </p:txBody>
+      </p:sp>
+      <p:sp>
+        <p:nvSpPr>
+          <p:cNvPr id="8211" name="AutoShape 136"/>
+          <p:cNvSpPr>
+            <a:spLocks noChangeAspect="1" noChangeArrowheads="1" noTextEdit="1"/>
+          </p:cNvSpPr>
+          <p:nvPr/>
+        </p:nvSpPr>
+        <p:spPr bwMode="auto">
+          <a:xfrm>
+            <a:off x="3392488" y="4244975"/>
+            <a:ext cx="2620962" cy="1376363"/>
+          </a:xfrm>
+          <a:prstGeom prst="rect">
+            <a:avLst/>
+          </a:prstGeom>
+          <a:noFill/>
+          <a:ln w="9525">
+            <a:noFill/>
+            <a:miter lim="800000"/>
+            <a:headEnd/>
+            <a:tailEnd/>
+          </a:ln>
+        </p:spPr>
+        <p:txBody>
+          <a:bodyPr/>
+          <a:lstStyle/>
+          <a:p>
+            <a:endParaRPr lang="en-US"/>
+          </a:p>
+        </p:txBody>
+      </p:sp>
+      <p:sp>
+        <p:nvSpPr>
+          <p:cNvPr id="8212" name="Text Box 142"/>
+          <p:cNvSpPr txBox="1">
+            <a:spLocks noChangeArrowheads="1"/>
+          </p:cNvSpPr>
+          <p:nvPr/>
+        </p:nvSpPr>
+        <p:spPr bwMode="auto">
+          <a:xfrm>
+            <a:off x="5462588" y="3919538"/>
+            <a:ext cx="382587" cy="522287"/>
+          </a:xfrm>
+          <a:prstGeom prst="rect">
+            <a:avLst/>
+          </a:prstGeom>
+          <a:noFill/>
+          <a:ln w="9525">
+            <a:noFill/>
+            <a:miter lim="800000"/>
+            <a:headEnd/>
+            <a:tailEnd type="none" w="lg" len="lg"/>
+          </a:ln>
+        </p:spPr>
+        <p:txBody>
+          <a:bodyPr wrap="none">
+            <a:spAutoFit/>
+          </a:bodyPr>
+          <a:lstStyle/>
+          <a:p>
+            <a:r>
+              <a:rPr lang="en-US" sz="2800" b="1">
+                <a:latin typeface="Comic Sans MS" pitchFamily="66" charset="0"/>
+              </a:rPr>
+              <a:t>a</a:t>
+            </a:r>
+          </a:p>
+        </p:txBody>
+      </p:sp>
+      <p:sp>
+        <p:nvSpPr>
+          <p:cNvPr id="8213" name="Text Box 143"/>
+          <p:cNvSpPr txBox="1">
+            <a:spLocks noChangeArrowheads="1"/>
+          </p:cNvSpPr>
+          <p:nvPr/>
+        </p:nvSpPr>
+        <p:spPr bwMode="auto">
+          <a:xfrm>
+            <a:off x="4083050" y="3935413"/>
+            <a:ext cx="817563" cy="523875"/>
+          </a:xfrm>
+          <a:prstGeom prst="rect">
+            <a:avLst/>
+          </a:prstGeom>
+          <a:noFill/>
+          <a:ln w="9525">
+            <a:noFill/>
+            <a:miter lim="800000"/>
+            <a:headEnd/>
+            <a:tailEnd type="none" w="lg" len="lg"/>
+          </a:ln>
+        </p:spPr>
+        <p:txBody>
+          <a:bodyPr wrap="none">
+            <a:spAutoFit/>
+          </a:bodyPr>
+          <a:lstStyle/>
+          <a:p>
+            <a:r>
+              <a:rPr lang="en-US" sz="2800" b="1">
+                <a:latin typeface="Comic Sans MS" pitchFamily="66" charset="0"/>
+              </a:rPr>
+              <a:t>b</a:t>
+            </a:r>
+            <a:r>
+              <a:rPr lang="en-US" sz="2800" b="1">
+                <a:latin typeface="Comic Sans MS" pitchFamily="66" charset="0"/>
+                <a:cs typeface="Times New Roman" pitchFamily="18" charset="0"/>
+              </a:rPr>
+              <a:t>-</a:t>
+            </a:r>
+            <a:r>
+              <a:rPr lang="en-US" sz="2800" b="1">
+                <a:latin typeface="Comic Sans MS" pitchFamily="66" charset="0"/>
+              </a:rPr>
+              <a:t>a</a:t>
+            </a:r>
+          </a:p>
+        </p:txBody>
+      </p:sp>
+      <p:graphicFrame>
+        <p:nvGraphicFramePr>
+          <p:cNvPr id="23" name="Object 22"/>
+          <p:cNvGraphicFramePr>
+            <a:graphicFrameLocks noChangeAspect="1"/>
+          </p:cNvGraphicFramePr>
+          <p:nvPr>
+            <p:extLst>
+              <p:ext uri="{D42A27DB-BD31-4B8C-83A1-F6EECF244321}">
+                <p14:modId xmlns:p14="http://schemas.microsoft.com/office/powerpoint/2010/main" val="2176458316"/>
+              </p:ext>
+            </p:extLst>
+          </p:nvPr>
+        </p:nvGraphicFramePr>
+        <p:xfrm>
+          <a:off x="3869748" y="3500582"/>
+          <a:ext cx="2806700" cy="1962150"/>
+        </p:xfrm>
+        <a:graphic>
+          <a:graphicData uri="http://schemas.openxmlformats.org/presentationml/2006/ole">
+            <mc:AlternateContent xmlns:mc="http://schemas.openxmlformats.org/markup-compatibility/2006">
+              <mc:Choice xmlns:v="urn:schemas-microsoft-com:vml" Requires="v">
+                <p:oleObj spid="_x0000_s187397" name="Equation" r:id="rId6" imgW="635000" imgH="444500" progId="Equation.DSMT4">
+                  <p:embed/>
+                </p:oleObj>
+              </mc:Choice>
+              <mc:Fallback>
+                <p:oleObj name="Equation" r:id="rId6" imgW="635000" imgH="444500" progId="Equation.DSMT4">
+                  <p:embed/>
+                  <p:pic>
+                    <p:nvPicPr>
+                      <p:cNvPr id="0" name=""/>
+                      <p:cNvPicPr/>
+                      <p:nvPr/>
+                    </p:nvPicPr>
+                    <p:blipFill>
+                      <a:blip r:embed="rId7"/>
+                      <a:stretch>
+                        <a:fillRect/>
+                      </a:stretch>
+                    </p:blipFill>
+                    <p:spPr>
+                      <a:xfrm>
+                        <a:off x="3869748" y="3500582"/>
+                        <a:ext cx="2806700" cy="1962150"/>
+                      </a:xfrm>
+                      <a:prstGeom prst="rect">
+                        <a:avLst/>
+                      </a:prstGeom>
+                    </p:spPr>
+                  </p:pic>
+                </p:oleObj>
+              </mc:Fallback>
+            </mc:AlternateContent>
+          </a:graphicData>
+        </a:graphic>
+      </p:graphicFrame>
+    </p:spTree>
+    <p:extLst>
+      <p:ext uri="{BB962C8B-B14F-4D97-AF65-F5344CB8AC3E}">
+        <p14:creationId xmlns:p14="http://schemas.microsoft.com/office/powerpoint/2010/main" val="3421818370"/>
+      </p:ext>
+    </p:extLst>
+  </p:cSld>
+  <p:clrMapOvr>
+    <a:masterClrMapping/>
+  </p:clrMapOvr>
+  <mc:AlternateContent xmlns:mc="http://schemas.openxmlformats.org/markup-compatibility/2006">
+    <mc:Choice xmlns:p14="http://schemas.microsoft.com/office/powerpoint/2010/main" Requires="p14">
+      <p:transition p14:dur="100">
+        <p:cut/>
+      </p:transition>
+    </mc:Choice>
+    <mc:Fallback>
+      <p:transition xmlns:p14="http://schemas.microsoft.com/office/powerpoint/2010/main">
+        <p:cut/>
+      </p:transition>
+    </mc:Fallback>
+  </mc:AlternateContent>
+  <p:timing>
+    <p:tnLst>
+      <p:par>
+        <p:cTn xmlns:p14="http://schemas.microsoft.com/office/powerpoint/2010/main" id="1" dur="indefinite" restart="never" nodeType="tmRoot">
+          <p:childTnLst>
+            <p:seq concurrent="1" nextAc="seek">
+              <p:cTn id="2" dur="indefinite" nodeType="mainSeq">
+                <p:childTnLst>
+                  <p:par>
+                    <p:cTn id="3" fill="hold">
+                      <p:stCondLst>
+                        <p:cond delay="indefinite"/>
+                        <p:cond evt="onBegin" delay="0">
+                          <p:tn val="2"/>
+                        </p:cond>
+                      </p:stCondLst>
+                      <p:childTnLst>
+                        <p:par>
+                          <p:cTn id="4" fill="hold">
+                            <p:stCondLst>
+                              <p:cond delay="0"/>
+                            </p:stCondLst>
+                            <p:childTnLst>
+                              <p:par>
+                                <p:cTn id="5" presetID="9" presetClass="entr" presetSubtype="0" fill="hold" nodeType="afterEffect">
+                                  <p:stCondLst>
+                                    <p:cond delay="0"/>
+                                  </p:stCondLst>
+                                  <p:childTnLst>
+                                    <p:set>
+                                      <p:cBhvr>
+                                        <p:cTn id="6" dur="1" fill="hold">
+                                          <p:stCondLst>
+                                            <p:cond delay="0"/>
+                                          </p:stCondLst>
+                                        </p:cTn>
+                                        <p:tgtEl>
+                                          <p:spTgt spid="23"/>
+                                        </p:tgtEl>
+                                        <p:attrNameLst>
+                                          <p:attrName>style.visibility</p:attrName>
+                                        </p:attrNameLst>
+                                      </p:cBhvr>
+                                      <p:to>
+                                        <p:strVal val="visible"/>
+                                      </p:to>
+                                    </p:set>
+                                    <p:animEffect transition="in" filter="dissolve">
+                                      <p:cBhvr>
+                                        <p:cTn id="7" dur="1000"/>
+                                        <p:tgtEl>
+                                          <p:spTgt spid="23"/>
                                         </p:tgtEl>
                                       </p:cBhvr>
                                     </p:animEffect>
@@ -11005,7 +11978,7 @@
 </p:sld>
 </file>
 
-<file path=ppt/slides/slide17.xml><?xml version="1.0" encoding="utf-8"?>
+<file path=ppt/slides/slide18.xml><?xml version="1.0" encoding="utf-8"?>
 <p:sld xmlns:a="http://schemas.openxmlformats.org/drawingml/2006/main" xmlns:r="http://schemas.openxmlformats.org/officeDocument/2006/relationships" xmlns:p="http://schemas.openxmlformats.org/presentationml/2006/main">
   <p:cSld>
     <p:spTree>
@@ -11050,7 +12023,7 @@
             <a:fld id="{50ABE7CE-A50A-4B65-8A8D-397E169FFA68}" type="slidenum">
               <a:rPr lang="en-US" sz="1200" smtClean="0"/>
               <a:pPr/>
-              <a:t>17</a:t>
+              <a:t>18</a:t>
             </a:fld>
             <a:endParaRPr lang="en-US" sz="1200" smtClean="0"/>
           </a:p>
@@ -13012,7 +13985,7 @@
 </p:sld>
 </file>
 
-<file path=ppt/slides/slide18.xml><?xml version="1.0" encoding="utf-8"?>
+<file path=ppt/slides/slide19.xml><?xml version="1.0" encoding="utf-8"?>
 <p:sld xmlns:a="http://schemas.openxmlformats.org/drawingml/2006/main" xmlns:r="http://schemas.openxmlformats.org/officeDocument/2006/relationships" xmlns:p="http://schemas.openxmlformats.org/presentationml/2006/main">
   <p:cSld>
     <p:spTree>
@@ -13057,7 +14030,7 @@
             <a:fld id="{63382AB9-401B-4352-B549-D0659292ECCD}" type="slidenum">
               <a:rPr lang="en-US" sz="1200" smtClean="0"/>
               <a:pPr/>
-              <a:t>18</a:t>
+              <a:t>19</a:t>
             </a:fld>
             <a:endParaRPr lang="en-US" sz="1200" smtClean="0"/>
           </a:p>
@@ -14453,7 +15426,7 @@
 </p:sld>
 </file>
 
-<file path=ppt/slides/slide19.xml><?xml version="1.0" encoding="utf-8"?>
+<file path=ppt/slides/slide2.xml><?xml version="1.0" encoding="utf-8"?>
 <p:sld xmlns:a="http://schemas.openxmlformats.org/drawingml/2006/main" xmlns:r="http://schemas.openxmlformats.org/officeDocument/2006/relationships" xmlns:p="http://schemas.openxmlformats.org/presentationml/2006/main">
   <p:cSld>
     <p:spTree>
@@ -14472,7 +15445,7 @@
       </p:grpSpPr>
       <p:sp>
         <p:nvSpPr>
-          <p:cNvPr id="31746" name="Slide Number Placeholder 2"/>
+          <p:cNvPr id="5125" name="Slide Number Placeholder 3"/>
           <p:cNvSpPr>
             <a:spLocks noGrp="1"/>
           </p:cNvSpPr>
@@ -14495,10 +15468,444 @@
               <a:rPr lang="en-US" sz="1200" smtClean="0"/>
               <a:t>lec 1W.</a:t>
             </a:r>
+            <a:fld id="{75023C36-FE4D-4530-8B57-5C3563E819D6}" type="slidenum">
+              <a:rPr lang="en-US" sz="1200" smtClean="0"/>
+              <a:pPr/>
+              <a:t>2</a:t>
+            </a:fld>
+            <a:endParaRPr lang="en-US" sz="1200" smtClean="0"/>
+          </a:p>
+        </p:txBody>
+      </p:sp>
+      <p:graphicFrame>
+        <p:nvGraphicFramePr>
+          <p:cNvPr id="5123" name="Object 4"/>
+          <p:cNvGraphicFramePr>
+            <a:graphicFrameLocks noChangeAspect="1"/>
+          </p:cNvGraphicFramePr>
+          <p:nvPr/>
+        </p:nvGraphicFramePr>
+        <p:xfrm>
+          <a:off x="4114800" y="3321050"/>
+          <a:ext cx="914400" cy="215900"/>
+        </p:xfrm>
+        <a:graphic>
+          <a:graphicData uri="http://schemas.openxmlformats.org/presentationml/2006/ole">
+            <mc:AlternateContent xmlns:mc="http://schemas.openxmlformats.org/markup-compatibility/2006">
+              <mc:Choice xmlns:v="urn:schemas-microsoft-com:vml" Requires="v">
+                <p:oleObj spid="_x0000_s140322" name="Equation" r:id="rId4" imgW="914400" imgH="215640" progId="Equation.3">
+                  <p:embed/>
+                </p:oleObj>
+              </mc:Choice>
+              <mc:Fallback>
+                <p:oleObj name="Equation" r:id="rId4" imgW="914400" imgH="215640" progId="Equation.3">
+                  <p:embed/>
+                  <p:pic>
+                    <p:nvPicPr>
+                      <p:cNvPr id="0" name="Object 4"/>
+                      <p:cNvPicPr>
+                        <a:picLocks noChangeAspect="1" noChangeArrowheads="1"/>
+                      </p:cNvPicPr>
+                      <p:nvPr/>
+                    </p:nvPicPr>
+                    <p:blipFill>
+                      <a:blip r:embed="rId5">
+                        <a:extLst>
+                          <a:ext uri="{28A0092B-C50C-407E-A947-70E740481C1C}">
+                            <a14:useLocalDpi xmlns:a14="http://schemas.microsoft.com/office/drawing/2010/main" val="0"/>
+                          </a:ext>
+                        </a:extLst>
+                      </a:blip>
+                      <a:srcRect/>
+                      <a:stretch>
+                        <a:fillRect/>
+                      </a:stretch>
+                    </p:blipFill>
+                    <p:spPr bwMode="auto">
+                      <a:xfrm>
+                        <a:off x="4114800" y="3321050"/>
+                        <a:ext cx="914400" cy="215900"/>
+                      </a:xfrm>
+                      <a:prstGeom prst="rect">
+                        <a:avLst/>
+                      </a:prstGeom>
+                      <a:noFill/>
+                      <a:extLst>
+                        <a:ext uri="{909E8E84-426E-40dd-AFC4-6F175D3DCCD1}">
+                          <a14:hiddenFill xmlns:a14="http://schemas.microsoft.com/office/drawing/2010/main">
+                            <a:solidFill>
+                              <a:srgbClr val="FFFFFF"/>
+                            </a:solidFill>
+                          </a14:hiddenFill>
+                        </a:ext>
+                      </a:extLst>
+                    </p:spPr>
+                  </p:pic>
+                </p:oleObj>
+              </mc:Fallback>
+            </mc:AlternateContent>
+          </a:graphicData>
+        </a:graphic>
+      </p:graphicFrame>
+      <p:graphicFrame>
+        <p:nvGraphicFramePr>
+          <p:cNvPr id="5124" name="Object 5"/>
+          <p:cNvGraphicFramePr>
+            <a:graphicFrameLocks noChangeAspect="1"/>
+          </p:cNvGraphicFramePr>
+          <p:nvPr/>
+        </p:nvGraphicFramePr>
+        <p:xfrm>
+          <a:off x="4114800" y="3321050"/>
+          <a:ext cx="914400" cy="215900"/>
+        </p:xfrm>
+        <a:graphic>
+          <a:graphicData uri="http://schemas.openxmlformats.org/presentationml/2006/ole">
+            <mc:AlternateContent xmlns:mc="http://schemas.openxmlformats.org/markup-compatibility/2006">
+              <mc:Choice xmlns:v="urn:schemas-microsoft-com:vml" Requires="v">
+                <p:oleObj spid="_x0000_s140323" name="Equation" r:id="rId6" imgW="914400" imgH="215640" progId="Equation.3">
+                  <p:embed/>
+                </p:oleObj>
+              </mc:Choice>
+              <mc:Fallback>
+                <p:oleObj name="Equation" r:id="rId6" imgW="914400" imgH="215640" progId="Equation.3">
+                  <p:embed/>
+                  <p:pic>
+                    <p:nvPicPr>
+                      <p:cNvPr id="0" name="Object 5"/>
+                      <p:cNvPicPr>
+                        <a:picLocks noChangeAspect="1" noChangeArrowheads="1"/>
+                      </p:cNvPicPr>
+                      <p:nvPr/>
+                    </p:nvPicPr>
+                    <p:blipFill>
+                      <a:blip r:embed="rId5">
+                        <a:extLst>
+                          <a:ext uri="{28A0092B-C50C-407E-A947-70E740481C1C}">
+                            <a14:useLocalDpi xmlns:a14="http://schemas.microsoft.com/office/drawing/2010/main" val="0"/>
+                          </a:ext>
+                        </a:extLst>
+                      </a:blip>
+                      <a:srcRect/>
+                      <a:stretch>
+                        <a:fillRect/>
+                      </a:stretch>
+                    </p:blipFill>
+                    <p:spPr bwMode="auto">
+                      <a:xfrm>
+                        <a:off x="4114800" y="3321050"/>
+                        <a:ext cx="914400" cy="215900"/>
+                      </a:xfrm>
+                      <a:prstGeom prst="rect">
+                        <a:avLst/>
+                      </a:prstGeom>
+                      <a:noFill/>
+                      <a:extLst>
+                        <a:ext uri="{909E8E84-426E-40dd-AFC4-6F175D3DCCD1}">
+                          <a14:hiddenFill xmlns:a14="http://schemas.microsoft.com/office/drawing/2010/main">
+                            <a:solidFill>
+                              <a:srgbClr val="FFFFFF"/>
+                            </a:solidFill>
+                          </a14:hiddenFill>
+                        </a:ext>
+                      </a:extLst>
+                    </p:spPr>
+                  </p:pic>
+                </p:oleObj>
+              </mc:Fallback>
+            </mc:AlternateContent>
+          </a:graphicData>
+        </a:graphic>
+      </p:graphicFrame>
+      <p:sp>
+        <p:nvSpPr>
+          <p:cNvPr id="5126" name="Text Box 6"/>
+          <p:cNvSpPr txBox="1">
+            <a:spLocks noChangeArrowheads="1"/>
+          </p:cNvSpPr>
+          <p:nvPr/>
+        </p:nvSpPr>
+        <p:spPr bwMode="auto">
+          <a:xfrm>
+            <a:off x="4251325" y="2457450"/>
+            <a:ext cx="184150" cy="579438"/>
+          </a:xfrm>
+          <a:prstGeom prst="rect">
+            <a:avLst/>
+          </a:prstGeom>
+          <a:noFill/>
+          <a:ln w="9525">
+            <a:noFill/>
+            <a:miter lim="800000"/>
+            <a:headEnd/>
+            <a:tailEnd type="none" w="lg" len="lg"/>
+          </a:ln>
+        </p:spPr>
+        <p:txBody>
+          <a:bodyPr wrap="none">
+            <a:spAutoFit/>
+          </a:bodyPr>
+          <a:lstStyle/>
+          <a:p>
+            <a:endParaRPr lang="en-US"/>
+          </a:p>
+        </p:txBody>
+      </p:sp>
+      <p:sp>
+        <p:nvSpPr>
+          <p:cNvPr id="5127" name="Rectangle 9"/>
+          <p:cNvSpPr>
+            <a:spLocks noGrp="1" noChangeArrowheads="1"/>
+          </p:cNvSpPr>
+          <p:nvPr>
+            <p:ph type="ctrTitle"/>
+          </p:nvPr>
+        </p:nvSpPr>
+        <p:spPr>
+          <a:xfrm>
+            <a:off x="1552575" y="277813"/>
+            <a:ext cx="6107113" cy="1154112"/>
+          </a:xfrm>
+          <a:noFill/>
+        </p:spPr>
+        <p:txBody>
+          <a:bodyPr/>
+          <a:lstStyle/>
+          <a:p>
+            <a:pPr eaLnBrk="1" hangingPunct="1"/>
+            <a:r>
+              <a:rPr lang="en-US" smtClean="0"/>
+              <a:t>Course Web site</a:t>
+            </a:r>
+          </a:p>
+        </p:txBody>
+      </p:sp>
+      <p:sp>
+        <p:nvSpPr>
+          <p:cNvPr id="5128" name="TextBox 8"/>
+          <p:cNvSpPr txBox="1">
+            <a:spLocks noChangeArrowheads="1"/>
+          </p:cNvSpPr>
+          <p:nvPr/>
+        </p:nvSpPr>
+        <p:spPr bwMode="auto">
+          <a:xfrm>
+            <a:off x="477838" y="1579561"/>
+            <a:ext cx="8188325" cy="4062651"/>
+          </a:xfrm>
+          <a:prstGeom prst="rect">
+            <a:avLst/>
+          </a:prstGeom>
+          <a:noFill/>
+          <a:ln w="9525">
+            <a:noFill/>
+            <a:miter lim="800000"/>
+            <a:headEnd/>
+            <a:tailEnd/>
+          </a:ln>
+        </p:spPr>
+        <p:txBody>
+          <a:bodyPr>
+            <a:spAutoFit/>
+          </a:bodyPr>
+          <a:lstStyle/>
+          <a:p>
+            <a:pPr>
+              <a:defRPr/>
+            </a:pPr>
+            <a:r>
+              <a:rPr lang="en-US" sz="2800" b="1" u="sng" dirty="0">
+                <a:solidFill>
+                  <a:srgbClr val="A0106D"/>
+                </a:solidFill>
+                <a:latin typeface="Courier New" pitchFamily="49" charset="0"/>
+                <a:cs typeface="Courier New" pitchFamily="49" charset="0"/>
+                <a:hlinkClick r:id="rId7"/>
+              </a:rPr>
+              <a:t>http://courses.csail.mit.edu/6.042</a:t>
+            </a:r>
+            <a:endParaRPr lang="en-US" sz="2800" b="1" dirty="0">
+              <a:solidFill>
+                <a:schemeClr val="accent1">
+                  <a:lumMod val="50000"/>
+                </a:schemeClr>
+              </a:solidFill>
+            </a:endParaRPr>
+          </a:p>
+          <a:p>
+            <a:pPr algn="l">
+              <a:spcBef>
+                <a:spcPts val="1200"/>
+              </a:spcBef>
+              <a:buFont typeface="Arial" pitchFamily="34" charset="0"/>
+              <a:buChar char="•"/>
+              <a:defRPr/>
+            </a:pPr>
+            <a:r>
+              <a:rPr lang="en-US" sz="4400" dirty="0">
+                <a:latin typeface="Comic Sans MS" pitchFamily="66" charset="0"/>
+              </a:rPr>
+              <a:t> </a:t>
+            </a:r>
+            <a:r>
+              <a:rPr lang="en-US" sz="4400" dirty="0" smtClean="0">
+                <a:latin typeface="Comic Sans MS" pitchFamily="66" charset="0"/>
+              </a:rPr>
+              <a:t>announcements</a:t>
+            </a:r>
+            <a:endParaRPr lang="en-US" sz="4400" dirty="0">
+              <a:latin typeface="Comic Sans MS" pitchFamily="66" charset="0"/>
+            </a:endParaRPr>
+          </a:p>
+          <a:p>
+            <a:pPr algn="l">
+              <a:buFont typeface="Arial" pitchFamily="34" charset="0"/>
+              <a:buChar char="•"/>
+              <a:defRPr/>
+            </a:pPr>
+            <a:r>
+              <a:rPr lang="en-US" sz="4400" dirty="0">
+                <a:solidFill>
+                  <a:srgbClr val="000000"/>
+                </a:solidFill>
+                <a:latin typeface="Comic Sans MS" pitchFamily="66" charset="0"/>
+              </a:rPr>
+              <a:t> class schedule</a:t>
+            </a:r>
+            <a:endParaRPr lang="en-US" dirty="0"/>
+          </a:p>
+          <a:p>
+            <a:pPr algn="l">
+              <a:buFont typeface="Arial" pitchFamily="34" charset="0"/>
+              <a:buChar char="•"/>
+              <a:defRPr/>
+            </a:pPr>
+            <a:r>
+              <a:rPr lang="en-US" sz="4400" dirty="0" smtClean="0">
+                <a:solidFill>
+                  <a:srgbClr val="000000"/>
+                </a:solidFill>
+                <a:latin typeface="Comic Sans MS" pitchFamily="66" charset="0"/>
+              </a:rPr>
+              <a:t> notes</a:t>
+            </a:r>
+            <a:r>
+              <a:rPr lang="en-US" sz="4400" dirty="0">
+                <a:solidFill>
+                  <a:srgbClr val="000000"/>
+                </a:solidFill>
+                <a:latin typeface="Comic Sans MS" pitchFamily="66" charset="0"/>
+              </a:rPr>
+              <a:t>, slides,…</a:t>
+            </a:r>
+          </a:p>
+          <a:p>
+            <a:pPr algn="l">
+              <a:buFont typeface="Arial" pitchFamily="34" charset="0"/>
+              <a:buChar char="•"/>
+              <a:defRPr/>
+            </a:pPr>
+            <a:r>
+              <a:rPr lang="en-US" sz="4400" dirty="0">
+                <a:solidFill>
+                  <a:srgbClr val="000000"/>
+                </a:solidFill>
+                <a:latin typeface="Comic Sans MS" pitchFamily="66" charset="0"/>
+              </a:rPr>
+              <a:t> </a:t>
+            </a:r>
+            <a:r>
+              <a:rPr lang="en-US" sz="4400" dirty="0" smtClean="0">
+                <a:solidFill>
+                  <a:srgbClr val="000000"/>
+                </a:solidFill>
+                <a:latin typeface="Comic Sans MS" pitchFamily="66" charset="0"/>
+              </a:rPr>
+              <a:t>course organization</a:t>
+            </a:r>
+          </a:p>
+          <a:p>
+            <a:pPr algn="l">
+              <a:buFont typeface="Arial" pitchFamily="34" charset="0"/>
+              <a:buChar char="•"/>
+              <a:defRPr/>
+            </a:pPr>
+            <a:r>
+              <a:rPr lang="en-US" sz="4400" dirty="0" smtClean="0">
+                <a:solidFill>
+                  <a:srgbClr val="000000"/>
+                </a:solidFill>
+                <a:latin typeface="Comic Sans MS" pitchFamily="66" charset="0"/>
+              </a:rPr>
+              <a:t> grading info</a:t>
+            </a:r>
+          </a:p>
+        </p:txBody>
+      </p:sp>
+    </p:spTree>
+  </p:cSld>
+  <p:clrMapOvr>
+    <a:masterClrMapping/>
+  </p:clrMapOvr>
+  <p:transition xmlns:p14="http://schemas.microsoft.com/office/powerpoint/2010/main">
+    <p:fade/>
+  </p:transition>
+  <p:timing>
+    <p:tnLst>
+      <p:par>
+        <p:cTn xmlns:p14="http://schemas.microsoft.com/office/powerpoint/2010/main" id="1" dur="indefinite" restart="never" nodeType="tmRoot"/>
+      </p:par>
+    </p:tnLst>
+  </p:timing>
+</p:sld>
+</file>
+
+<file path=ppt/slides/slide20.xml><?xml version="1.0" encoding="utf-8"?>
+<p:sld xmlns:a="http://schemas.openxmlformats.org/drawingml/2006/main" xmlns:r="http://schemas.openxmlformats.org/officeDocument/2006/relationships" xmlns:p="http://schemas.openxmlformats.org/presentationml/2006/main">
+  <p:cSld>
+    <p:spTree>
+      <p:nvGrpSpPr>
+        <p:cNvPr id="1" name=""/>
+        <p:cNvGrpSpPr/>
+        <p:nvPr/>
+      </p:nvGrpSpPr>
+      <p:grpSpPr>
+        <a:xfrm>
+          <a:off x="0" y="0"/>
+          <a:ext cx="0" cy="0"/>
+          <a:chOff x="0" y="0"/>
+          <a:chExt cx="0" cy="0"/>
+        </a:xfrm>
+      </p:grpSpPr>
+      <p:sp>
+        <p:nvSpPr>
+          <p:cNvPr id="31746" name="Slide Number Placeholder 2"/>
+          <p:cNvSpPr>
+            <a:spLocks noGrp="1"/>
+          </p:cNvSpPr>
+          <p:nvPr>
+            <p:ph type="sldNum" sz="quarter" idx="10"/>
+          </p:nvPr>
+        </p:nvSpPr>
+        <p:spPr>
+          <a:noFill/>
+        </p:spPr>
+        <p:txBody>
+          <a:bodyPr/>
+          <a:lstStyle/>
+          <a:p>
+            <a:r>
+              <a:rPr lang="en-US" smtClean="0"/>
+              <a:t>      </a:t>
+            </a:r>
+            <a:r>
+              <a:rPr lang="en-US" sz="1200" smtClean="0"/>
+              <a:t>lec 1W.</a:t>
+            </a:r>
             <a:fld id="{530F5DA7-E64F-4D07-8D9B-A445C7617EFD}" type="slidenum">
               <a:rPr lang="en-US" sz="1200" smtClean="0"/>
               <a:pPr/>
-              <a:t>19</a:t>
+              <a:t>20</a:t>
             </a:fld>
             <a:endParaRPr lang="en-US" sz="1200" smtClean="0"/>
           </a:p>
@@ -15420,441 +16827,7 @@
 </p:sld>
 </file>
 
-<file path=ppt/slides/slide2.xml><?xml version="1.0" encoding="utf-8"?>
-<p:sld xmlns:a="http://schemas.openxmlformats.org/drawingml/2006/main" xmlns:r="http://schemas.openxmlformats.org/officeDocument/2006/relationships" xmlns:p="http://schemas.openxmlformats.org/presentationml/2006/main">
-  <p:cSld>
-    <p:spTree>
-      <p:nvGrpSpPr>
-        <p:cNvPr id="1" name=""/>
-        <p:cNvGrpSpPr/>
-        <p:nvPr/>
-      </p:nvGrpSpPr>
-      <p:grpSpPr>
-        <a:xfrm>
-          <a:off x="0" y="0"/>
-          <a:ext cx="0" cy="0"/>
-          <a:chOff x="0" y="0"/>
-          <a:chExt cx="0" cy="0"/>
-        </a:xfrm>
-      </p:grpSpPr>
-      <p:sp>
-        <p:nvSpPr>
-          <p:cNvPr id="5125" name="Slide Number Placeholder 3"/>
-          <p:cNvSpPr>
-            <a:spLocks noGrp="1"/>
-          </p:cNvSpPr>
-          <p:nvPr>
-            <p:ph type="sldNum" sz="quarter" idx="10"/>
-          </p:nvPr>
-        </p:nvSpPr>
-        <p:spPr>
-          <a:noFill/>
-        </p:spPr>
-        <p:txBody>
-          <a:bodyPr/>
-          <a:lstStyle/>
-          <a:p>
-            <a:r>
-              <a:rPr lang="en-US" smtClean="0"/>
-              <a:t>      </a:t>
-            </a:r>
-            <a:r>
-              <a:rPr lang="en-US" sz="1200" smtClean="0"/>
-              <a:t>lec 1W.</a:t>
-            </a:r>
-            <a:fld id="{75023C36-FE4D-4530-8B57-5C3563E819D6}" type="slidenum">
-              <a:rPr lang="en-US" sz="1200" smtClean="0"/>
-              <a:pPr/>
-              <a:t>2</a:t>
-            </a:fld>
-            <a:endParaRPr lang="en-US" sz="1200" smtClean="0"/>
-          </a:p>
-        </p:txBody>
-      </p:sp>
-      <p:graphicFrame>
-        <p:nvGraphicFramePr>
-          <p:cNvPr id="5123" name="Object 4"/>
-          <p:cNvGraphicFramePr>
-            <a:graphicFrameLocks noChangeAspect="1"/>
-          </p:cNvGraphicFramePr>
-          <p:nvPr/>
-        </p:nvGraphicFramePr>
-        <p:xfrm>
-          <a:off x="4114800" y="3321050"/>
-          <a:ext cx="914400" cy="215900"/>
-        </p:xfrm>
-        <a:graphic>
-          <a:graphicData uri="http://schemas.openxmlformats.org/presentationml/2006/ole">
-            <mc:AlternateContent xmlns:mc="http://schemas.openxmlformats.org/markup-compatibility/2006">
-              <mc:Choice xmlns:v="urn:schemas-microsoft-com:vml" Requires="v">
-                <p:oleObj spid="_x0000_s140317" name="Equation" r:id="rId4" imgW="914400" imgH="215640" progId="Equation.3">
-                  <p:embed/>
-                </p:oleObj>
-              </mc:Choice>
-              <mc:Fallback>
-                <p:oleObj name="Equation" r:id="rId4" imgW="914400" imgH="215640" progId="Equation.3">
-                  <p:embed/>
-                  <p:pic>
-                    <p:nvPicPr>
-                      <p:cNvPr id="0" name="Object 4"/>
-                      <p:cNvPicPr>
-                        <a:picLocks noChangeAspect="1" noChangeArrowheads="1"/>
-                      </p:cNvPicPr>
-                      <p:nvPr/>
-                    </p:nvPicPr>
-                    <p:blipFill>
-                      <a:blip r:embed="rId5">
-                        <a:extLst>
-                          <a:ext uri="{28A0092B-C50C-407E-A947-70E740481C1C}">
-                            <a14:useLocalDpi xmlns:a14="http://schemas.microsoft.com/office/drawing/2010/main" val="0"/>
-                          </a:ext>
-                        </a:extLst>
-                      </a:blip>
-                      <a:srcRect/>
-                      <a:stretch>
-                        <a:fillRect/>
-                      </a:stretch>
-                    </p:blipFill>
-                    <p:spPr bwMode="auto">
-                      <a:xfrm>
-                        <a:off x="4114800" y="3321050"/>
-                        <a:ext cx="914400" cy="215900"/>
-                      </a:xfrm>
-                      <a:prstGeom prst="rect">
-                        <a:avLst/>
-                      </a:prstGeom>
-                      <a:noFill/>
-                      <a:extLst>
-                        <a:ext uri="{909E8E84-426E-40dd-AFC4-6F175D3DCCD1}">
-                          <a14:hiddenFill xmlns:a14="http://schemas.microsoft.com/office/drawing/2010/main">
-                            <a:solidFill>
-                              <a:srgbClr val="FFFFFF"/>
-                            </a:solidFill>
-                          </a14:hiddenFill>
-                        </a:ext>
-                      </a:extLst>
-                    </p:spPr>
-                  </p:pic>
-                </p:oleObj>
-              </mc:Fallback>
-            </mc:AlternateContent>
-          </a:graphicData>
-        </a:graphic>
-      </p:graphicFrame>
-      <p:graphicFrame>
-        <p:nvGraphicFramePr>
-          <p:cNvPr id="5124" name="Object 5"/>
-          <p:cNvGraphicFramePr>
-            <a:graphicFrameLocks noChangeAspect="1"/>
-          </p:cNvGraphicFramePr>
-          <p:nvPr/>
-        </p:nvGraphicFramePr>
-        <p:xfrm>
-          <a:off x="4114800" y="3321050"/>
-          <a:ext cx="914400" cy="215900"/>
-        </p:xfrm>
-        <a:graphic>
-          <a:graphicData uri="http://schemas.openxmlformats.org/presentationml/2006/ole">
-            <mc:AlternateContent xmlns:mc="http://schemas.openxmlformats.org/markup-compatibility/2006">
-              <mc:Choice xmlns:v="urn:schemas-microsoft-com:vml" Requires="v">
-                <p:oleObj spid="_x0000_s140318" name="Equation" r:id="rId6" imgW="914400" imgH="215640" progId="Equation.3">
-                  <p:embed/>
-                </p:oleObj>
-              </mc:Choice>
-              <mc:Fallback>
-                <p:oleObj name="Equation" r:id="rId6" imgW="914400" imgH="215640" progId="Equation.3">
-                  <p:embed/>
-                  <p:pic>
-                    <p:nvPicPr>
-                      <p:cNvPr id="0" name="Object 5"/>
-                      <p:cNvPicPr>
-                        <a:picLocks noChangeAspect="1" noChangeArrowheads="1"/>
-                      </p:cNvPicPr>
-                      <p:nvPr/>
-                    </p:nvPicPr>
-                    <p:blipFill>
-                      <a:blip r:embed="rId5">
-                        <a:extLst>
-                          <a:ext uri="{28A0092B-C50C-407E-A947-70E740481C1C}">
-                            <a14:useLocalDpi xmlns:a14="http://schemas.microsoft.com/office/drawing/2010/main" val="0"/>
-                          </a:ext>
-                        </a:extLst>
-                      </a:blip>
-                      <a:srcRect/>
-                      <a:stretch>
-                        <a:fillRect/>
-                      </a:stretch>
-                    </p:blipFill>
-                    <p:spPr bwMode="auto">
-                      <a:xfrm>
-                        <a:off x="4114800" y="3321050"/>
-                        <a:ext cx="914400" cy="215900"/>
-                      </a:xfrm>
-                      <a:prstGeom prst="rect">
-                        <a:avLst/>
-                      </a:prstGeom>
-                      <a:noFill/>
-                      <a:extLst>
-                        <a:ext uri="{909E8E84-426E-40dd-AFC4-6F175D3DCCD1}">
-                          <a14:hiddenFill xmlns:a14="http://schemas.microsoft.com/office/drawing/2010/main">
-                            <a:solidFill>
-                              <a:srgbClr val="FFFFFF"/>
-                            </a:solidFill>
-                          </a14:hiddenFill>
-                        </a:ext>
-                      </a:extLst>
-                    </p:spPr>
-                  </p:pic>
-                </p:oleObj>
-              </mc:Fallback>
-            </mc:AlternateContent>
-          </a:graphicData>
-        </a:graphic>
-      </p:graphicFrame>
-      <p:sp>
-        <p:nvSpPr>
-          <p:cNvPr id="5126" name="Text Box 6"/>
-          <p:cNvSpPr txBox="1">
-            <a:spLocks noChangeArrowheads="1"/>
-          </p:cNvSpPr>
-          <p:nvPr/>
-        </p:nvSpPr>
-        <p:spPr bwMode="auto">
-          <a:xfrm>
-            <a:off x="4251325" y="2457450"/>
-            <a:ext cx="184150" cy="579438"/>
-          </a:xfrm>
-          <a:prstGeom prst="rect">
-            <a:avLst/>
-          </a:prstGeom>
-          <a:noFill/>
-          <a:ln w="9525">
-            <a:noFill/>
-            <a:miter lim="800000"/>
-            <a:headEnd/>
-            <a:tailEnd type="none" w="lg" len="lg"/>
-          </a:ln>
-        </p:spPr>
-        <p:txBody>
-          <a:bodyPr wrap="none">
-            <a:spAutoFit/>
-          </a:bodyPr>
-          <a:lstStyle/>
-          <a:p>
-            <a:endParaRPr lang="en-US"/>
-          </a:p>
-        </p:txBody>
-      </p:sp>
-      <p:sp>
-        <p:nvSpPr>
-          <p:cNvPr id="5127" name="Rectangle 9"/>
-          <p:cNvSpPr>
-            <a:spLocks noGrp="1" noChangeArrowheads="1"/>
-          </p:cNvSpPr>
-          <p:nvPr>
-            <p:ph type="ctrTitle"/>
-          </p:nvPr>
-        </p:nvSpPr>
-        <p:spPr>
-          <a:xfrm>
-            <a:off x="1552575" y="277813"/>
-            <a:ext cx="6107113" cy="1154112"/>
-          </a:xfrm>
-          <a:noFill/>
-        </p:spPr>
-        <p:txBody>
-          <a:bodyPr/>
-          <a:lstStyle/>
-          <a:p>
-            <a:pPr eaLnBrk="1" hangingPunct="1"/>
-            <a:r>
-              <a:rPr lang="en-US" smtClean="0"/>
-              <a:t>Course Web site</a:t>
-            </a:r>
-          </a:p>
-        </p:txBody>
-      </p:sp>
-      <p:sp>
-        <p:nvSpPr>
-          <p:cNvPr id="5128" name="TextBox 8"/>
-          <p:cNvSpPr txBox="1">
-            <a:spLocks noChangeArrowheads="1"/>
-          </p:cNvSpPr>
-          <p:nvPr/>
-        </p:nvSpPr>
-        <p:spPr bwMode="auto">
-          <a:xfrm>
-            <a:off x="477838" y="1579561"/>
-            <a:ext cx="8188325" cy="4062651"/>
-          </a:xfrm>
-          <a:prstGeom prst="rect">
-            <a:avLst/>
-          </a:prstGeom>
-          <a:noFill/>
-          <a:ln w="9525">
-            <a:noFill/>
-            <a:miter lim="800000"/>
-            <a:headEnd/>
-            <a:tailEnd/>
-          </a:ln>
-        </p:spPr>
-        <p:txBody>
-          <a:bodyPr>
-            <a:spAutoFit/>
-          </a:bodyPr>
-          <a:lstStyle/>
-          <a:p>
-            <a:pPr>
-              <a:defRPr/>
-            </a:pPr>
-            <a:r>
-              <a:rPr lang="en-US" sz="2800" b="1" u="sng" dirty="0">
-                <a:solidFill>
-                  <a:srgbClr val="A0106D"/>
-                </a:solidFill>
-                <a:latin typeface="Courier New" pitchFamily="49" charset="0"/>
-                <a:cs typeface="Courier New" pitchFamily="49" charset="0"/>
-                <a:hlinkClick r:id="rId7"/>
-              </a:rPr>
-              <a:t>http://courses.csail.mit.edu/6.042</a:t>
-            </a:r>
-            <a:endParaRPr lang="en-US" sz="2800" b="1" dirty="0">
-              <a:solidFill>
-                <a:schemeClr val="accent1">
-                  <a:lumMod val="50000"/>
-                </a:schemeClr>
-              </a:solidFill>
-            </a:endParaRPr>
-          </a:p>
-          <a:p>
-            <a:pPr algn="l">
-              <a:spcBef>
-                <a:spcPts val="1200"/>
-              </a:spcBef>
-              <a:buFont typeface="Arial" pitchFamily="34" charset="0"/>
-              <a:buChar char="•"/>
-              <a:defRPr/>
-            </a:pPr>
-            <a:r>
-              <a:rPr lang="en-US" sz="4400" dirty="0">
-                <a:latin typeface="Comic Sans MS" pitchFamily="66" charset="0"/>
-              </a:rPr>
-              <a:t> </a:t>
-            </a:r>
-            <a:r>
-              <a:rPr lang="en-US" sz="4400" dirty="0" smtClean="0">
-                <a:latin typeface="Comic Sans MS" pitchFamily="66" charset="0"/>
-              </a:rPr>
-              <a:t>announcements</a:t>
-            </a:r>
-            <a:endParaRPr lang="en-US" sz="4400" dirty="0">
-              <a:latin typeface="Comic Sans MS" pitchFamily="66" charset="0"/>
-            </a:endParaRPr>
-          </a:p>
-          <a:p>
-            <a:pPr algn="l">
-              <a:buFont typeface="Arial" pitchFamily="34" charset="0"/>
-              <a:buChar char="•"/>
-              <a:defRPr/>
-            </a:pPr>
-            <a:r>
-              <a:rPr lang="en-US" sz="4400" dirty="0">
-                <a:solidFill>
-                  <a:srgbClr val="000000"/>
-                </a:solidFill>
-                <a:latin typeface="Comic Sans MS" pitchFamily="66" charset="0"/>
-              </a:rPr>
-              <a:t> class schedule</a:t>
-            </a:r>
-            <a:endParaRPr lang="en-US" dirty="0"/>
-          </a:p>
-          <a:p>
-            <a:pPr algn="l">
-              <a:buFont typeface="Arial" pitchFamily="34" charset="0"/>
-              <a:buChar char="•"/>
-              <a:defRPr/>
-            </a:pPr>
-            <a:r>
-              <a:rPr lang="en-US" sz="4400" dirty="0" smtClean="0">
-                <a:solidFill>
-                  <a:srgbClr val="000000"/>
-                </a:solidFill>
-                <a:latin typeface="Comic Sans MS" pitchFamily="66" charset="0"/>
-              </a:rPr>
-              <a:t> notes</a:t>
-            </a:r>
-            <a:r>
-              <a:rPr lang="en-US" sz="4400" dirty="0">
-                <a:solidFill>
-                  <a:srgbClr val="000000"/>
-                </a:solidFill>
-                <a:latin typeface="Comic Sans MS" pitchFamily="66" charset="0"/>
-              </a:rPr>
-              <a:t>, slides,…</a:t>
-            </a:r>
-          </a:p>
-          <a:p>
-            <a:pPr algn="l">
-              <a:buFont typeface="Arial" pitchFamily="34" charset="0"/>
-              <a:buChar char="•"/>
-              <a:defRPr/>
-            </a:pPr>
-            <a:r>
-              <a:rPr lang="en-US" sz="4400" dirty="0">
-                <a:solidFill>
-                  <a:srgbClr val="000000"/>
-                </a:solidFill>
-                <a:latin typeface="Comic Sans MS" pitchFamily="66" charset="0"/>
-              </a:rPr>
-              <a:t> </a:t>
-            </a:r>
-            <a:r>
-              <a:rPr lang="en-US" sz="4400" dirty="0" smtClean="0">
-                <a:solidFill>
-                  <a:srgbClr val="000000"/>
-                </a:solidFill>
-                <a:latin typeface="Comic Sans MS" pitchFamily="66" charset="0"/>
-              </a:rPr>
-              <a:t>course organization</a:t>
-            </a:r>
-          </a:p>
-          <a:p>
-            <a:pPr algn="l">
-              <a:buFont typeface="Arial" pitchFamily="34" charset="0"/>
-              <a:buChar char="•"/>
-              <a:defRPr/>
-            </a:pPr>
-            <a:r>
-              <a:rPr lang="en-US" sz="4400" dirty="0" smtClean="0">
-                <a:solidFill>
-                  <a:srgbClr val="000000"/>
-                </a:solidFill>
-                <a:latin typeface="Comic Sans MS" pitchFamily="66" charset="0"/>
-              </a:rPr>
-              <a:t> grading info</a:t>
-            </a:r>
-          </a:p>
-        </p:txBody>
-      </p:sp>
-    </p:spTree>
-  </p:cSld>
-  <p:clrMapOvr>
-    <a:masterClrMapping/>
-  </p:clrMapOvr>
-  <p:transition xmlns:p14="http://schemas.microsoft.com/office/powerpoint/2010/main">
-    <p:fade/>
-  </p:transition>
-  <p:timing>
-    <p:tnLst>
-      <p:par>
-        <p:cTn xmlns:p14="http://schemas.microsoft.com/office/powerpoint/2010/main" id="1" dur="indefinite" restart="never" nodeType="tmRoot"/>
-      </p:par>
-    </p:tnLst>
-  </p:timing>
-</p:sld>
-</file>
-
-<file path=ppt/slides/slide20.xml><?xml version="1.0" encoding="utf-8"?>
+<file path=ppt/slides/slide21.xml><?xml version="1.0" encoding="utf-8"?>
 <p:sld xmlns:a="http://schemas.openxmlformats.org/drawingml/2006/main" xmlns:r="http://schemas.openxmlformats.org/officeDocument/2006/relationships" xmlns:p="http://schemas.openxmlformats.org/presentationml/2006/main" show="0">
   <p:cSld>
     <p:spTree>
@@ -15903,7 +16876,7 @@
             <a:fld id="{12CF27A8-2E27-47D3-89F5-30D5C89B3807}" type="slidenum">
               <a:rPr lang="en-US" sz="1200" smtClean="0"/>
               <a:pPr/>
-              <a:t>20</a:t>
+              <a:t>21</a:t>
             </a:fld>
             <a:endParaRPr lang="en-US" sz="1200" smtClean="0"/>
           </a:p>
@@ -16073,7 +17046,7 @@
           <a:graphicData uri="http://schemas.openxmlformats.org/presentationml/2006/ole">
             <mc:AlternateContent xmlns:mc="http://schemas.openxmlformats.org/markup-compatibility/2006">
               <mc:Choice xmlns:v="urn:schemas-microsoft-com:vml" Requires="v">
-                <p:oleObj spid="_x0000_s9253" name="Equation" r:id="rId4" imgW="1257120" imgH="444240" progId="Equation.DSMT4">
+                <p:oleObj spid="_x0000_s9260" name="Equation" r:id="rId4" imgW="1257120" imgH="444240" progId="Equation.DSMT4">
                   <p:embed/>
                 </p:oleObj>
               </mc:Choice>
@@ -16168,7 +17141,7 @@
           <a:graphicData uri="http://schemas.openxmlformats.org/presentationml/2006/ole">
             <mc:AlternateContent xmlns:mc="http://schemas.openxmlformats.org/markup-compatibility/2006">
               <mc:Choice xmlns:v="urn:schemas-microsoft-com:vml" Requires="v">
-                <p:oleObj spid="_x0000_s9254" name="Equation" r:id="rId6" imgW="1269720" imgH="444240" progId="Equation.DSMT4">
+                <p:oleObj spid="_x0000_s9261" name="Equation" r:id="rId6" imgW="1269720" imgH="444240" progId="Equation.DSMT4">
                   <p:embed/>
                 </p:oleObj>
               </mc:Choice>
@@ -16341,7 +17314,7 @@
           <a:graphicData uri="http://schemas.openxmlformats.org/presentationml/2006/ole">
             <mc:AlternateContent xmlns:mc="http://schemas.openxmlformats.org/markup-compatibility/2006">
               <mc:Choice xmlns:v="urn:schemas-microsoft-com:vml" Requires="v">
-                <p:oleObj spid="_x0000_s9255" name="Equation" r:id="rId8" imgW="774360" imgH="203040" progId="Equation.DSMT4">
+                <p:oleObj spid="_x0000_s9262" name="Equation" r:id="rId8" imgW="774360" imgH="203040" progId="Equation.DSMT4">
                   <p:embed/>
                 </p:oleObj>
               </mc:Choice>
@@ -16594,7 +17567,7 @@
 </p:sld>
 </file>
 
-<file path=ppt/slides/slide21.xml><?xml version="1.0" encoding="utf-8"?>
+<file path=ppt/slides/slide22.xml><?xml version="1.0" encoding="utf-8"?>
 <p:sld xmlns:a="http://schemas.openxmlformats.org/drawingml/2006/main" xmlns:r="http://schemas.openxmlformats.org/officeDocument/2006/relationships" xmlns:p="http://schemas.openxmlformats.org/presentationml/2006/main" show="0">
   <p:cSld>
     <p:spTree>
@@ -16643,7 +17616,7 @@
             <a:fld id="{E92C81C8-F27D-4AE4-B619-67321854E34B}" type="slidenum">
               <a:rPr lang="en-US" sz="1200" smtClean="0"/>
               <a:pPr/>
-              <a:t>21</a:t>
+              <a:t>22</a:t>
             </a:fld>
             <a:endParaRPr lang="en-US" sz="1200" smtClean="0"/>
           </a:p>
@@ -16868,7 +17841,7 @@
             <a:graphicData uri="http://schemas.openxmlformats.org/presentationml/2006/ole">
               <mc:AlternateContent xmlns:mc="http://schemas.openxmlformats.org/markup-compatibility/2006">
                 <mc:Choice xmlns:v="urn:schemas-microsoft-com:vml" Requires="v">
-                  <p:oleObj spid="_x0000_s10267" name="Equation" r:id="rId4" imgW="774360" imgH="203040" progId="Equation.DSMT4">
+                  <p:oleObj spid="_x0000_s10272" name="Equation" r:id="rId4" imgW="774360" imgH="203040" progId="Equation.DSMT4">
                     <p:embed/>
                   </p:oleObj>
                 </mc:Choice>
@@ -17033,7 +18006,7 @@
             <a:graphicData uri="http://schemas.openxmlformats.org/presentationml/2006/ole">
               <mc:AlternateContent xmlns:mc="http://schemas.openxmlformats.org/markup-compatibility/2006">
                 <mc:Choice xmlns:v="urn:schemas-microsoft-com:vml" Requires="v">
-                  <p:oleObj spid="_x0000_s10268" name="Equation" r:id="rId6" imgW="736560" imgH="203040" progId="Equation.DSMT4">
+                  <p:oleObj spid="_x0000_s10273" name="Equation" r:id="rId6" imgW="736560" imgH="203040" progId="Equation.DSMT4">
                     <p:embed/>
                   </p:oleObj>
                 </mc:Choice>
@@ -17267,7 +18240,7 @@
 </p:sld>
 </file>
 
-<file path=ppt/slides/slide22.xml><?xml version="1.0" encoding="utf-8"?>
+<file path=ppt/slides/slide23.xml><?xml version="1.0" encoding="utf-8"?>
 <p:sld xmlns:a="http://schemas.openxmlformats.org/drawingml/2006/main" xmlns:r="http://schemas.openxmlformats.org/officeDocument/2006/relationships" xmlns:p="http://schemas.openxmlformats.org/presentationml/2006/main" show="0">
   <p:cSld>
     <p:spTree>
@@ -17316,7 +18289,7 @@
             <a:fld id="{6F847A86-0EF0-4A1A-87B4-C860551EA508}" type="slidenum">
               <a:rPr lang="en-US" sz="1200" smtClean="0"/>
               <a:pPr/>
-              <a:t>22</a:t>
+              <a:t>23</a:t>
             </a:fld>
             <a:endParaRPr lang="en-US" sz="1200" smtClean="0"/>
           </a:p>
@@ -17758,7 +18731,7 @@
           <a:graphicData uri="http://schemas.openxmlformats.org/presentationml/2006/ole">
             <mc:AlternateContent xmlns:mc="http://schemas.openxmlformats.org/markup-compatibility/2006">
               <mc:Choice xmlns:v="urn:schemas-microsoft-com:vml" Requires="v">
-                <p:oleObj spid="_x0000_s11291" name="Equation" r:id="rId4" imgW="114120" imgH="177480" progId="Equation.DSMT4">
+                <p:oleObj spid="_x0000_s11296" name="Equation" r:id="rId4" imgW="114120" imgH="177480" progId="Equation.DSMT4">
                   <p:embed/>
                 </p:oleObj>
               </mc:Choice>
@@ -17828,7 +18801,7 @@
           <a:graphicData uri="http://schemas.openxmlformats.org/presentationml/2006/ole">
             <mc:AlternateContent xmlns:mc="http://schemas.openxmlformats.org/markup-compatibility/2006">
               <mc:Choice xmlns:v="urn:schemas-microsoft-com:vml" Requires="v">
-                <p:oleObj spid="_x0000_s11292" name="Equation" r:id="rId6" imgW="114120" imgH="177480" progId="Equation.DSMT4">
+                <p:oleObj spid="_x0000_s11297" name="Equation" r:id="rId6" imgW="114120" imgH="177480" progId="Equation.DSMT4">
                   <p:embed/>
                 </p:oleObj>
               </mc:Choice>
@@ -18052,114 +19025,6 @@
 </p:sld>
 </file>
 
-<file path=ppt/slides/slide23.xml><?xml version="1.0" encoding="utf-8"?>
-<p:sld xmlns:a="http://schemas.openxmlformats.org/drawingml/2006/main" xmlns:r="http://schemas.openxmlformats.org/officeDocument/2006/relationships" xmlns:p="http://schemas.openxmlformats.org/presentationml/2006/main">
-  <p:cSld>
-    <p:spTree>
-      <p:nvGrpSpPr>
-        <p:cNvPr id="1" name=""/>
-        <p:cNvGrpSpPr/>
-        <p:nvPr/>
-      </p:nvGrpSpPr>
-      <p:grpSpPr>
-        <a:xfrm>
-          <a:off x="0" y="0"/>
-          <a:ext cx="0" cy="0"/>
-          <a:chOff x="0" y="0"/>
-          <a:chExt cx="0" cy="0"/>
-        </a:xfrm>
-      </p:grpSpPr>
-      <p:sp>
-        <p:nvSpPr>
-          <p:cNvPr id="2" name="Title 1"/>
-          <p:cNvSpPr>
-            <a:spLocks noGrp="1"/>
-          </p:cNvSpPr>
-          <p:nvPr>
-            <p:ph type="title"/>
-          </p:nvPr>
-        </p:nvSpPr>
-        <p:spPr/>
-        <p:txBody>
-          <a:bodyPr/>
-          <a:lstStyle/>
-          <a:p>
-            <a:endParaRPr lang="en-US"/>
-          </a:p>
-        </p:txBody>
-      </p:sp>
-      <p:sp>
-        <p:nvSpPr>
-          <p:cNvPr id="3" name="Content Placeholder 2"/>
-          <p:cNvSpPr>
-            <a:spLocks noGrp="1"/>
-          </p:cNvSpPr>
-          <p:nvPr>
-            <p:ph idx="1"/>
-          </p:nvPr>
-        </p:nvSpPr>
-        <p:spPr/>
-        <p:txBody>
-          <a:bodyPr/>
-          <a:lstStyle/>
-          <a:p>
-            <a:endParaRPr lang="en-US"/>
-          </a:p>
-        </p:txBody>
-      </p:sp>
-      <p:sp>
-        <p:nvSpPr>
-          <p:cNvPr id="4" name="Slide Number Placeholder 3"/>
-          <p:cNvSpPr>
-            <a:spLocks noGrp="1"/>
-          </p:cNvSpPr>
-          <p:nvPr>
-            <p:ph type="sldNum" sz="quarter" idx="10"/>
-          </p:nvPr>
-        </p:nvSpPr>
-        <p:spPr/>
-        <p:txBody>
-          <a:bodyPr/>
-          <a:lstStyle/>
-          <a:p>
-            <a:pPr>
-              <a:defRPr/>
-            </a:pPr>
-            <a:r>
-              <a:rPr lang="en-US" smtClean="0"/>
-              <a:t>      </a:t>
-            </a:r>
-            <a:r>
-              <a:rPr lang="en-US" sz="1200" smtClean="0"/>
-              <a:t>lec 1W.</a:t>
-            </a:r>
-            <a:fld id="{9A106780-21EA-4C13-B4C5-F962BEA7B00B}" type="slidenum">
-              <a:rPr lang="en-US" sz="1200" smtClean="0"/>
-              <a:pPr>
-                <a:defRPr/>
-              </a:pPr>
-              <a:t>23</a:t>
-            </a:fld>
-            <a:endParaRPr lang="en-US" sz="1200"/>
-          </a:p>
-        </p:txBody>
-      </p:sp>
-    </p:spTree>
-    <p:extLst>
-      <p:ext uri="{BB962C8B-B14F-4D97-AF65-F5344CB8AC3E}">
-        <p14:creationId xmlns:p14="http://schemas.microsoft.com/office/powerpoint/2010/main" val="2117748607"/>
-      </p:ext>
-    </p:extLst>
-  </p:cSld>
-  <p:clrMapOvr>
-    <a:masterClrMapping/>
-  </p:clrMapOvr>
-  <p:transition xmlns:p14="http://schemas.microsoft.com/office/powerpoint/2010/main">
-    <p:fade/>
-  </p:transition>
-</p:sld>
-</file>
-
 <file path=ppt/slides/slide24.xml><?xml version="1.0" encoding="utf-8"?>
 <p:sld xmlns:a="http://schemas.openxmlformats.org/drawingml/2006/main" xmlns:r="http://schemas.openxmlformats.org/officeDocument/2006/relationships" xmlns:p="http://schemas.openxmlformats.org/presentationml/2006/main">
   <p:cSld>
@@ -18255,6 +19120,114 @@
     </p:spTree>
     <p:extLst>
       <p:ext uri="{BB962C8B-B14F-4D97-AF65-F5344CB8AC3E}">
+        <p14:creationId xmlns:p14="http://schemas.microsoft.com/office/powerpoint/2010/main" val="2117748607"/>
+      </p:ext>
+    </p:extLst>
+  </p:cSld>
+  <p:clrMapOvr>
+    <a:masterClrMapping/>
+  </p:clrMapOvr>
+  <p:transition xmlns:p14="http://schemas.microsoft.com/office/powerpoint/2010/main">
+    <p:fade/>
+  </p:transition>
+</p:sld>
+</file>
+
+<file path=ppt/slides/slide25.xml><?xml version="1.0" encoding="utf-8"?>
+<p:sld xmlns:a="http://schemas.openxmlformats.org/drawingml/2006/main" xmlns:r="http://schemas.openxmlformats.org/officeDocument/2006/relationships" xmlns:p="http://schemas.openxmlformats.org/presentationml/2006/main">
+  <p:cSld>
+    <p:spTree>
+      <p:nvGrpSpPr>
+        <p:cNvPr id="1" name=""/>
+        <p:cNvGrpSpPr/>
+        <p:nvPr/>
+      </p:nvGrpSpPr>
+      <p:grpSpPr>
+        <a:xfrm>
+          <a:off x="0" y="0"/>
+          <a:ext cx="0" cy="0"/>
+          <a:chOff x="0" y="0"/>
+          <a:chExt cx="0" cy="0"/>
+        </a:xfrm>
+      </p:grpSpPr>
+      <p:sp>
+        <p:nvSpPr>
+          <p:cNvPr id="2" name="Title 1"/>
+          <p:cNvSpPr>
+            <a:spLocks noGrp="1"/>
+          </p:cNvSpPr>
+          <p:nvPr>
+            <p:ph type="title"/>
+          </p:nvPr>
+        </p:nvSpPr>
+        <p:spPr/>
+        <p:txBody>
+          <a:bodyPr/>
+          <a:lstStyle/>
+          <a:p>
+            <a:endParaRPr lang="en-US"/>
+          </a:p>
+        </p:txBody>
+      </p:sp>
+      <p:sp>
+        <p:nvSpPr>
+          <p:cNvPr id="3" name="Content Placeholder 2"/>
+          <p:cNvSpPr>
+            <a:spLocks noGrp="1"/>
+          </p:cNvSpPr>
+          <p:nvPr>
+            <p:ph idx="1"/>
+          </p:nvPr>
+        </p:nvSpPr>
+        <p:spPr/>
+        <p:txBody>
+          <a:bodyPr/>
+          <a:lstStyle/>
+          <a:p>
+            <a:endParaRPr lang="en-US"/>
+          </a:p>
+        </p:txBody>
+      </p:sp>
+      <p:sp>
+        <p:nvSpPr>
+          <p:cNvPr id="4" name="Slide Number Placeholder 3"/>
+          <p:cNvSpPr>
+            <a:spLocks noGrp="1"/>
+          </p:cNvSpPr>
+          <p:nvPr>
+            <p:ph type="sldNum" sz="quarter" idx="10"/>
+          </p:nvPr>
+        </p:nvSpPr>
+        <p:spPr/>
+        <p:txBody>
+          <a:bodyPr/>
+          <a:lstStyle/>
+          <a:p>
+            <a:pPr>
+              <a:defRPr/>
+            </a:pPr>
+            <a:r>
+              <a:rPr lang="en-US" smtClean="0"/>
+              <a:t>      </a:t>
+            </a:r>
+            <a:r>
+              <a:rPr lang="en-US" sz="1200" smtClean="0"/>
+              <a:t>lec 1W.</a:t>
+            </a:r>
+            <a:fld id="{9A106780-21EA-4C13-B4C5-F962BEA7B00B}" type="slidenum">
+              <a:rPr lang="en-US" sz="1200" smtClean="0"/>
+              <a:pPr>
+                <a:defRPr/>
+              </a:pPr>
+              <a:t>25</a:t>
+            </a:fld>
+            <a:endParaRPr lang="en-US" sz="1200"/>
+          </a:p>
+        </p:txBody>
+      </p:sp>
+    </p:spTree>
+    <p:extLst>
+      <p:ext uri="{BB962C8B-B14F-4D97-AF65-F5344CB8AC3E}">
         <p14:creationId xmlns:p14="http://schemas.microsoft.com/office/powerpoint/2010/main" val="22152456"/>
       </p:ext>
     </p:extLst>
@@ -18268,7 +19241,7 @@
 </p:sld>
 </file>
 
-<file path=ppt/slides/slide25.xml><?xml version="1.0" encoding="utf-8"?>
+<file path=ppt/slides/slide26.xml><?xml version="1.0" encoding="utf-8"?>
 <p:sld xmlns:a="http://schemas.openxmlformats.org/drawingml/2006/main" xmlns:r="http://schemas.openxmlformats.org/officeDocument/2006/relationships" xmlns:p="http://schemas.openxmlformats.org/presentationml/2006/main" show="0">
   <p:cSld>
     <p:spTree>
@@ -18317,7 +19290,7 @@
             <a:fld id="{D06E24C3-47EC-4B6B-B7C6-E5F18597FBA4}" type="slidenum">
               <a:rPr lang="en-US" sz="1200" smtClean="0"/>
               <a:pPr/>
-              <a:t>25</a:t>
+              <a:t>26</a:t>
             </a:fld>
             <a:endParaRPr lang="en-US" sz="1200" smtClean="0"/>
           </a:p>
@@ -18708,7 +19681,7 @@
 </p:sld>
 </file>
 
-<file path=ppt/slides/slide26.xml><?xml version="1.0" encoding="utf-8"?>
+<file path=ppt/slides/slide27.xml><?xml version="1.0" encoding="utf-8"?>
 <p:sld xmlns:a="http://schemas.openxmlformats.org/drawingml/2006/main" xmlns:r="http://schemas.openxmlformats.org/officeDocument/2006/relationships" xmlns:p="http://schemas.openxmlformats.org/presentationml/2006/main" show="0">
   <p:cSld>
     <p:spTree>
@@ -18757,7 +19730,7 @@
             <a:fld id="{38814692-9BDD-4F2D-A9DA-07816390A204}" type="slidenum">
               <a:rPr lang="en-US" sz="1200" smtClean="0"/>
               <a:pPr/>
-              <a:t>26</a:t>
+              <a:t>27</a:t>
             </a:fld>
             <a:endParaRPr lang="en-US" sz="1200" smtClean="0"/>
           </a:p>
@@ -18849,7 +19822,7 @@
           <a:graphicData uri="http://schemas.openxmlformats.org/presentationml/2006/ole">
             <mc:AlternateContent xmlns:mc="http://schemas.openxmlformats.org/markup-compatibility/2006">
               <mc:Choice xmlns:v="urn:schemas-microsoft-com:vml" Requires="v">
-                <p:oleObj spid="_x0000_s184337" name="Equation" r:id="rId4" imgW="2590560" imgH="368280" progId="Equation.DSMT4">
+                <p:oleObj spid="_x0000_s184340" name="Equation" r:id="rId4" imgW="2590560" imgH="368280" progId="Equation.DSMT4">
                   <p:embed/>
                 </p:oleObj>
               </mc:Choice>
@@ -19125,7 +20098,7 @@
 </p:sld>
 </file>
 
-<file path=ppt/slides/slide27.xml><?xml version="1.0" encoding="utf-8"?>
+<file path=ppt/slides/slide28.xml><?xml version="1.0" encoding="utf-8"?>
 <p:sld xmlns:a="http://schemas.openxmlformats.org/drawingml/2006/main" xmlns:r="http://schemas.openxmlformats.org/officeDocument/2006/relationships" xmlns:p="http://schemas.openxmlformats.org/presentationml/2006/main">
   <p:cSld>
     <p:spTree>
@@ -19174,7 +20147,7 @@
             <a:fld id="{38814692-9BDD-4F2D-A9DA-07816390A204}" type="slidenum">
               <a:rPr lang="en-US" sz="1200" smtClean="0"/>
               <a:pPr/>
-              <a:t>27</a:t>
+              <a:t>28</a:t>
             </a:fld>
             <a:endParaRPr lang="en-US" sz="1200" smtClean="0"/>
           </a:p>
@@ -19291,7 +20264,7 @@
           <a:graphicData uri="http://schemas.openxmlformats.org/presentationml/2006/ole">
             <mc:AlternateContent xmlns:mc="http://schemas.openxmlformats.org/markup-compatibility/2006">
               <mc:Choice xmlns:v="urn:schemas-microsoft-com:vml" Requires="v">
-                <p:oleObj spid="_x0000_s12305" name="Equation" r:id="rId4" imgW="2590560" imgH="368280" progId="Equation.DSMT4">
+                <p:oleObj spid="_x0000_s12308" name="Equation" r:id="rId4" imgW="2590560" imgH="368280" progId="Equation.DSMT4">
                   <p:embed/>
                 </p:oleObj>
               </mc:Choice>
@@ -19759,7 +20732,7 @@
 </p:sld>
 </file>
 
-<file path=ppt/slides/slide28.xml><?xml version="1.0" encoding="utf-8"?>
+<file path=ppt/slides/slide29.xml><?xml version="1.0" encoding="utf-8"?>
 <p:sld xmlns:a="http://schemas.openxmlformats.org/drawingml/2006/main" xmlns:r="http://schemas.openxmlformats.org/officeDocument/2006/relationships" xmlns:p="http://schemas.openxmlformats.org/presentationml/2006/main">
   <p:cSld>
     <p:spTree>
@@ -19804,7 +20777,7 @@
             <a:fld id="{149CEC67-A6D5-4032-8245-198398361EE0}" type="slidenum">
               <a:rPr lang="en-US" sz="1200" smtClean="0"/>
               <a:pPr/>
-              <a:t>28</a:t>
+              <a:t>29</a:t>
             </a:fld>
             <a:endParaRPr lang="en-US" sz="1200" smtClean="0"/>
           </a:p>
@@ -20125,7 +21098,7 @@
           <a:graphicData uri="http://schemas.openxmlformats.org/presentationml/2006/ole">
             <mc:AlternateContent xmlns:mc="http://schemas.openxmlformats.org/markup-compatibility/2006">
               <mc:Choice xmlns:v="urn:schemas-microsoft-com:vml" Requires="v">
-                <p:oleObj spid="_x0000_s13329" name="Equation" r:id="rId4" imgW="152280" imgH="393480" progId="Equation.DSMT4">
+                <p:oleObj spid="_x0000_s13332" name="Equation" r:id="rId4" imgW="152280" imgH="393480" progId="Equation.DSMT4">
                   <p:embed/>
                 </p:oleObj>
               </mc:Choice>
@@ -20344,242 +21317,6 @@
 </p:sld>
 </file>
 
-<file path=ppt/slides/slide29.xml><?xml version="1.0" encoding="utf-8"?>
-<p:sld xmlns:a="http://schemas.openxmlformats.org/drawingml/2006/main" xmlns:r="http://schemas.openxmlformats.org/officeDocument/2006/relationships" xmlns:p="http://schemas.openxmlformats.org/presentationml/2006/main">
-  <p:cSld>
-    <p:spTree>
-      <p:nvGrpSpPr>
-        <p:cNvPr id="1" name=""/>
-        <p:cNvGrpSpPr/>
-        <p:nvPr/>
-      </p:nvGrpSpPr>
-      <p:grpSpPr>
-        <a:xfrm>
-          <a:off x="0" y="0"/>
-          <a:ext cx="0" cy="0"/>
-          <a:chOff x="0" y="0"/>
-          <a:chExt cx="0" cy="0"/>
-        </a:xfrm>
-      </p:grpSpPr>
-      <p:sp>
-        <p:nvSpPr>
-          <p:cNvPr id="33794" name="Slide Number Placeholder 3"/>
-          <p:cNvSpPr>
-            <a:spLocks noGrp="1"/>
-          </p:cNvSpPr>
-          <p:nvPr>
-            <p:ph type="sldNum" sz="quarter" idx="10"/>
-          </p:nvPr>
-        </p:nvSpPr>
-        <p:spPr>
-          <a:noFill/>
-        </p:spPr>
-        <p:txBody>
-          <a:bodyPr/>
-          <a:lstStyle/>
-          <a:p>
-            <a:r>
-              <a:rPr lang="en-US" smtClean="0"/>
-              <a:t>      </a:t>
-            </a:r>
-            <a:r>
-              <a:rPr lang="en-US" sz="1200" smtClean="0"/>
-              <a:t>lec 1W.</a:t>
-            </a:r>
-            <a:fld id="{17F4D99F-8DB9-47AB-B21C-80A9F5EE51B9}" type="slidenum">
-              <a:rPr lang="en-US" sz="1200" smtClean="0"/>
-              <a:pPr/>
-              <a:t>29</a:t>
-            </a:fld>
-            <a:endParaRPr lang="en-US" sz="1200" smtClean="0"/>
-          </a:p>
-        </p:txBody>
-      </p:sp>
-      <p:sp>
-        <p:nvSpPr>
-          <p:cNvPr id="33795" name="Rectangle 2"/>
-          <p:cNvSpPr>
-            <a:spLocks noGrp="1" noChangeArrowheads="1"/>
-          </p:cNvSpPr>
-          <p:nvPr>
-            <p:ph type="title"/>
-          </p:nvPr>
-        </p:nvSpPr>
-        <p:spPr/>
-        <p:txBody>
-          <a:bodyPr/>
-          <a:lstStyle/>
-          <a:p>
-            <a:pPr eaLnBrk="1" hangingPunct="1"/>
-            <a:r>
-              <a:rPr lang="en-US" dirty="0" smtClean="0"/>
-              <a:t>Consequences of  1= </a:t>
-            </a:r>
-            <a:r>
-              <a:rPr lang="en-US" dirty="0" smtClean="0">
-                <a:sym typeface="Symbol" pitchFamily="18" charset="2"/>
-              </a:rPr>
-              <a:t>-</a:t>
-            </a:r>
-            <a:r>
-              <a:rPr lang="en-US" dirty="0" smtClean="0"/>
-              <a:t>1</a:t>
-            </a:r>
-          </a:p>
-        </p:txBody>
-      </p:sp>
-      <p:sp>
-        <p:nvSpPr>
-          <p:cNvPr id="33796" name="Text Box 3"/>
-          <p:cNvSpPr txBox="1">
-            <a:spLocks noChangeArrowheads="1"/>
-          </p:cNvSpPr>
-          <p:nvPr/>
-        </p:nvSpPr>
-        <p:spPr bwMode="auto">
-          <a:xfrm>
-            <a:off x="914400" y="5186363"/>
-            <a:ext cx="7272338" cy="563562"/>
-          </a:xfrm>
-          <a:prstGeom prst="rect">
-            <a:avLst/>
-          </a:prstGeom>
-          <a:noFill/>
-          <a:ln w="9525">
-            <a:noFill/>
-            <a:miter lim="800000"/>
-            <a:headEnd/>
-            <a:tailEnd/>
-          </a:ln>
-        </p:spPr>
-        <p:txBody>
-          <a:bodyPr>
-            <a:spAutoFit/>
-          </a:bodyPr>
-          <a:lstStyle/>
-          <a:p>
-            <a:pPr marL="231775" indent="-231775" algn="l">
-              <a:lnSpc>
-                <a:spcPct val="85000"/>
-              </a:lnSpc>
-              <a:spcBef>
-                <a:spcPct val="10000"/>
-              </a:spcBef>
-            </a:pPr>
-            <a:r>
-              <a:rPr lang="en-US" sz="3600" b="1">
-                <a:solidFill>
-                  <a:schemeClr val="hlink"/>
-                </a:solidFill>
-                <a:latin typeface="Comic Sans MS" pitchFamily="66" charset="0"/>
-              </a:rPr>
-              <a:t>Bertrand Russell </a:t>
-            </a:r>
-            <a:r>
-              <a:rPr lang="en-US" sz="3600" b="1">
-                <a:latin typeface="Comic Sans MS" pitchFamily="66" charset="0"/>
-              </a:rPr>
-              <a:t>(1872 - 1970)</a:t>
-            </a:r>
-            <a:endParaRPr lang="en-US" sz="3600">
-              <a:latin typeface="Comic Sans MS" pitchFamily="66" charset="0"/>
-            </a:endParaRPr>
-          </a:p>
-        </p:txBody>
-      </p:sp>
-      <p:pic>
-        <p:nvPicPr>
-          <p:cNvPr id="33797" name="Picture 6" descr="title3"/>
-          <p:cNvPicPr>
-            <a:picLocks noGrp="1" noChangeAspect="1" noChangeArrowheads="1"/>
-          </p:cNvPicPr>
-          <p:nvPr>
-            <p:ph idx="1"/>
-          </p:nvPr>
-        </p:nvPicPr>
-        <p:blipFill>
-          <a:blip r:embed="rId3" cstate="print"/>
-          <a:srcRect/>
-          <a:stretch>
-            <a:fillRect/>
-          </a:stretch>
-        </p:blipFill>
-        <p:spPr>
-          <a:xfrm>
-            <a:off x="3019425" y="1690688"/>
-            <a:ext cx="3060700" cy="3060700"/>
-          </a:xfrm>
-          <a:noFill/>
-        </p:spPr>
-      </p:pic>
-      <p:sp>
-        <p:nvSpPr>
-          <p:cNvPr id="33798" name="Text Box 8"/>
-          <p:cNvSpPr txBox="1">
-            <a:spLocks noChangeArrowheads="1"/>
-          </p:cNvSpPr>
-          <p:nvPr/>
-        </p:nvSpPr>
-        <p:spPr bwMode="auto">
-          <a:xfrm>
-            <a:off x="2573338" y="6026150"/>
-            <a:ext cx="3568700" cy="244475"/>
-          </a:xfrm>
-          <a:prstGeom prst="rect">
-            <a:avLst/>
-          </a:prstGeom>
-          <a:noFill/>
-          <a:ln w="9525">
-            <a:noFill/>
-            <a:miter lim="800000"/>
-            <a:headEnd/>
-            <a:tailEnd type="none" w="lg" len="lg"/>
-          </a:ln>
-        </p:spPr>
-        <p:txBody>
-          <a:bodyPr wrap="none">
-            <a:spAutoFit/>
-          </a:bodyPr>
-          <a:lstStyle/>
-          <a:p>
-            <a:r>
-              <a:rPr lang="en-US" sz="1000"/>
-              <a:t>(Picture source: </a:t>
-            </a:r>
-            <a:r>
-              <a:rPr lang="en-US" sz="800">
-                <a:latin typeface="Courier New" pitchFamily="49" charset="0"/>
-              </a:rPr>
-              <a:t>http://www.users.drew.edu/~jlenz/brs.html</a:t>
-            </a:r>
-            <a:r>
-              <a:rPr lang="en-US" sz="1000">
-                <a:latin typeface="Courier New" pitchFamily="49" charset="0"/>
-              </a:rPr>
-              <a:t>)</a:t>
-            </a:r>
-            <a:endParaRPr lang="en-US" sz="1000"/>
-          </a:p>
-        </p:txBody>
-      </p:sp>
-    </p:spTree>
-  </p:cSld>
-  <p:clrMapOvr>
-    <a:masterClrMapping/>
-  </p:clrMapOvr>
-  <p:transition xmlns:p14="http://schemas.microsoft.com/office/powerpoint/2010/main">
-    <p:fade/>
-  </p:transition>
-  <p:timing>
-    <p:tnLst>
-      <p:par>
-        <p:cTn xmlns:p14="http://schemas.microsoft.com/office/powerpoint/2010/main" id="1" dur="indefinite" restart="never" nodeType="tmRoot"/>
-      </p:par>
-    </p:tnLst>
-  </p:timing>
-</p:sld>
-</file>
-
 <file path=ppt/slides/slide3.xml><?xml version="1.0" encoding="utf-8"?>
 <p:sld xmlns:a="http://schemas.openxmlformats.org/drawingml/2006/main" xmlns:r="http://schemas.openxmlformats.org/officeDocument/2006/relationships" xmlns:p="http://schemas.openxmlformats.org/presentationml/2006/main">
   <p:cSld>
@@ -20700,7 +21437,7 @@
           <a:graphicData uri="http://schemas.openxmlformats.org/presentationml/2006/ole">
             <mc:AlternateContent xmlns:mc="http://schemas.openxmlformats.org/markup-compatibility/2006">
               <mc:Choice xmlns:v="urn:schemas-microsoft-com:vml" Requires="v">
-                <p:oleObj spid="_x0000_s2082" name="Equation" r:id="rId4" imgW="914400" imgH="215640" progId="Equation.3">
+                <p:oleObj spid="_x0000_s2087" name="Equation" r:id="rId4" imgW="914400" imgH="215640" progId="Equation.3">
                   <p:embed/>
                 </p:oleObj>
               </mc:Choice>
@@ -20770,7 +21507,7 @@
           <a:graphicData uri="http://schemas.openxmlformats.org/presentationml/2006/ole">
             <mc:AlternateContent xmlns:mc="http://schemas.openxmlformats.org/markup-compatibility/2006">
               <mc:Choice xmlns:v="urn:schemas-microsoft-com:vml" Requires="v">
-                <p:oleObj spid="_x0000_s2083" name="Equation" r:id="rId6" imgW="914400" imgH="215640" progId="Equation.3">
+                <p:oleObj spid="_x0000_s2088" name="Equation" r:id="rId6" imgW="914400" imgH="215640" progId="Equation.3">
                   <p:embed/>
                 </p:oleObj>
               </mc:Choice>
@@ -21311,7 +22048,7 @@
       </p:grpSpPr>
       <p:sp>
         <p:nvSpPr>
-          <p:cNvPr id="34818" name="Slide Number Placeholder 3"/>
+          <p:cNvPr id="33794" name="Slide Number Placeholder 3"/>
           <p:cNvSpPr>
             <a:spLocks noGrp="1"/>
           </p:cNvSpPr>
@@ -21320,21 +22057,21 @@
           </p:nvPr>
         </p:nvSpPr>
         <p:spPr>
-          <a:xfrm>
-            <a:off x="8250238" y="6567488"/>
-            <a:ext cx="893762" cy="276225"/>
-          </a:xfrm>
           <a:noFill/>
         </p:spPr>
         <p:txBody>
           <a:bodyPr/>
           <a:lstStyle/>
           <a:p>
+            <a:r>
+              <a:rPr lang="en-US" smtClean="0"/>
+              <a:t>      </a:t>
+            </a:r>
             <a:r>
               <a:rPr lang="en-US" sz="1200" smtClean="0"/>
               <a:t>lec 1W.</a:t>
             </a:r>
-            <a:fld id="{EB421C7E-0655-4947-B06C-8554469D79B2}" type="slidenum">
+            <a:fld id="{17F4D99F-8DB9-47AB-B21C-80A9F5EE51B9}" type="slidenum">
               <a:rPr lang="en-US" sz="1200" smtClean="0"/>
               <a:pPr/>
               <a:t>30</a:t>
@@ -21345,7 +22082,7 @@
       </p:sp>
       <p:sp>
         <p:nvSpPr>
-          <p:cNvPr id="34819" name="Rectangle 2"/>
+          <p:cNvPr id="33795" name="Rectangle 2"/>
           <p:cNvSpPr>
             <a:spLocks noGrp="1" noChangeArrowheads="1"/>
           </p:cNvSpPr>
@@ -21358,62 +22095,155 @@
           <a:bodyPr/>
           <a:lstStyle/>
           <a:p>
-            <a:r>
-              <a:rPr lang="en-US" sz="5400" dirty="0" smtClean="0"/>
-              <a:t>Team Problems</a:t>
-            </a:r>
-          </a:p>
-        </p:txBody>
-      </p:sp>
-      <p:sp>
-        <p:nvSpPr>
-          <p:cNvPr id="34820" name="Rectangle 3"/>
-          <p:cNvSpPr>
-            <a:spLocks noGrp="1" noChangeArrowheads="1"/>
-          </p:cNvSpPr>
+            <a:pPr eaLnBrk="1" hangingPunct="1"/>
+            <a:r>
+              <a:rPr lang="en-US" dirty="0" smtClean="0"/>
+              <a:t>Consequences of  1= </a:t>
+            </a:r>
+            <a:r>
+              <a:rPr lang="en-US" dirty="0" smtClean="0">
+                <a:sym typeface="Symbol" pitchFamily="18" charset="2"/>
+              </a:rPr>
+              <a:t>-</a:t>
+            </a:r>
+            <a:r>
+              <a:rPr lang="en-US" dirty="0" smtClean="0"/>
+              <a:t>1</a:t>
+            </a:r>
+          </a:p>
+        </p:txBody>
+      </p:sp>
+      <p:sp>
+        <p:nvSpPr>
+          <p:cNvPr id="33796" name="Text Box 3"/>
+          <p:cNvSpPr txBox="1">
+            <a:spLocks noChangeArrowheads="1"/>
+          </p:cNvSpPr>
+          <p:nvPr/>
+        </p:nvSpPr>
+        <p:spPr bwMode="auto">
+          <a:xfrm>
+            <a:off x="914400" y="5186363"/>
+            <a:ext cx="7272338" cy="563562"/>
+          </a:xfrm>
+          <a:prstGeom prst="rect">
+            <a:avLst/>
+          </a:prstGeom>
+          <a:noFill/>
+          <a:ln w="9525">
+            <a:noFill/>
+            <a:miter lim="800000"/>
+            <a:headEnd/>
+            <a:tailEnd/>
+          </a:ln>
+        </p:spPr>
+        <p:txBody>
+          <a:bodyPr>
+            <a:spAutoFit/>
+          </a:bodyPr>
+          <a:lstStyle/>
+          <a:p>
+            <a:pPr marL="231775" indent="-231775" algn="l">
+              <a:lnSpc>
+                <a:spcPct val="85000"/>
+              </a:lnSpc>
+              <a:spcBef>
+                <a:spcPct val="10000"/>
+              </a:spcBef>
+            </a:pPr>
+            <a:r>
+              <a:rPr lang="en-US" sz="3600" b="1">
+                <a:solidFill>
+                  <a:schemeClr val="hlink"/>
+                </a:solidFill>
+                <a:latin typeface="Comic Sans MS" pitchFamily="66" charset="0"/>
+              </a:rPr>
+              <a:t>Bertrand Russell </a:t>
+            </a:r>
+            <a:r>
+              <a:rPr lang="en-US" sz="3600" b="1">
+                <a:latin typeface="Comic Sans MS" pitchFamily="66" charset="0"/>
+              </a:rPr>
+              <a:t>(1872 - 1970)</a:t>
+            </a:r>
+            <a:endParaRPr lang="en-US" sz="3600">
+              <a:latin typeface="Comic Sans MS" pitchFamily="66" charset="0"/>
+            </a:endParaRPr>
+          </a:p>
+        </p:txBody>
+      </p:sp>
+      <p:pic>
+        <p:nvPicPr>
+          <p:cNvPr id="33797" name="Picture 6" descr="title3"/>
+          <p:cNvPicPr>
+            <a:picLocks noGrp="1" noChangeAspect="1" noChangeArrowheads="1"/>
+          </p:cNvPicPr>
           <p:nvPr>
-            <p:ph type="body" idx="1"/>
+            <p:ph idx="1"/>
           </p:nvPr>
-        </p:nvSpPr>
+        </p:nvPicPr>
+        <p:blipFill>
+          <a:blip r:embed="rId3" cstate="print"/>
+          <a:srcRect/>
+          <a:stretch>
+            <a:fillRect/>
+          </a:stretch>
+        </p:blipFill>
         <p:spPr>
           <a:xfrm>
-            <a:off x="685800" y="1536700"/>
-            <a:ext cx="7708900" cy="3821113"/>
+            <a:off x="3019425" y="1690688"/>
+            <a:ext cx="3060700" cy="3060700"/>
           </a:xfrm>
-        </p:spPr>
-        <p:txBody>
-          <a:bodyPr/>
-          <a:lstStyle/>
-          <a:p>
-            <a:pPr algn="ctr">
-              <a:buFontTx/>
-              <a:buNone/>
-            </a:pPr>
-            <a:r>
-              <a:rPr lang="en-US" sz="10600" dirty="0" smtClean="0"/>
-              <a:t>Problems</a:t>
-            </a:r>
-          </a:p>
-          <a:p>
-            <a:pPr algn="ctr">
-              <a:buFontTx/>
-              <a:buNone/>
-            </a:pPr>
-            <a:r>
-              <a:rPr lang="en-US" sz="9600" dirty="0" smtClean="0"/>
-              <a:t>1</a:t>
-            </a:r>
-            <a:r>
-              <a:rPr lang="en-US" sz="9600" b="1" dirty="0" smtClean="0">
-                <a:latin typeface="Euclid Symbol" charset="2"/>
-                <a:cs typeface="Euclid Symbol" charset="2"/>
-              </a:rPr>
-              <a:t>–</a:t>
-            </a:r>
-            <a:r>
-              <a:rPr lang="en-US" sz="9600" dirty="0" smtClean="0"/>
-              <a:t>3</a:t>
-            </a:r>
+          <a:noFill/>
+        </p:spPr>
+      </p:pic>
+      <p:sp>
+        <p:nvSpPr>
+          <p:cNvPr id="33798" name="Text Box 8"/>
+          <p:cNvSpPr txBox="1">
+            <a:spLocks noChangeArrowheads="1"/>
+          </p:cNvSpPr>
+          <p:nvPr/>
+        </p:nvSpPr>
+        <p:spPr bwMode="auto">
+          <a:xfrm>
+            <a:off x="2573338" y="6026150"/>
+            <a:ext cx="3568700" cy="244475"/>
+          </a:xfrm>
+          <a:prstGeom prst="rect">
+            <a:avLst/>
+          </a:prstGeom>
+          <a:noFill/>
+          <a:ln w="9525">
+            <a:noFill/>
+            <a:miter lim="800000"/>
+            <a:headEnd/>
+            <a:tailEnd type="none" w="lg" len="lg"/>
+          </a:ln>
+        </p:spPr>
+        <p:txBody>
+          <a:bodyPr wrap="none">
+            <a:spAutoFit/>
+          </a:bodyPr>
+          <a:lstStyle/>
+          <a:p>
+            <a:r>
+              <a:rPr lang="en-US" sz="1000"/>
+              <a:t>(Picture source: </a:t>
+            </a:r>
+            <a:r>
+              <a:rPr lang="en-US" sz="800">
+                <a:latin typeface="Courier New" pitchFamily="49" charset="0"/>
+              </a:rPr>
+              <a:t>http://www.users.drew.edu/~jlenz/brs.html</a:t>
+            </a:r>
+            <a:r>
+              <a:rPr lang="en-US" sz="1000">
+                <a:latin typeface="Courier New" pitchFamily="49" charset="0"/>
+              </a:rPr>
+              <a:t>)</a:t>
+            </a:r>
+            <a:endParaRPr lang="en-US" sz="1000"/>
           </a:p>
         </p:txBody>
       </p:sp>
@@ -21454,6 +22284,149 @@
       </p:grpSpPr>
       <p:sp>
         <p:nvSpPr>
+          <p:cNvPr id="34818" name="Slide Number Placeholder 3"/>
+          <p:cNvSpPr>
+            <a:spLocks noGrp="1"/>
+          </p:cNvSpPr>
+          <p:nvPr>
+            <p:ph type="sldNum" sz="quarter" idx="10"/>
+          </p:nvPr>
+        </p:nvSpPr>
+        <p:spPr>
+          <a:xfrm>
+            <a:off x="8250238" y="6567488"/>
+            <a:ext cx="893762" cy="276225"/>
+          </a:xfrm>
+          <a:noFill/>
+        </p:spPr>
+        <p:txBody>
+          <a:bodyPr/>
+          <a:lstStyle/>
+          <a:p>
+            <a:r>
+              <a:rPr lang="en-US" sz="1200" smtClean="0"/>
+              <a:t>lec 1W.</a:t>
+            </a:r>
+            <a:fld id="{EB421C7E-0655-4947-B06C-8554469D79B2}" type="slidenum">
+              <a:rPr lang="en-US" sz="1200" smtClean="0"/>
+              <a:pPr/>
+              <a:t>31</a:t>
+            </a:fld>
+            <a:endParaRPr lang="en-US" sz="1200" smtClean="0"/>
+          </a:p>
+        </p:txBody>
+      </p:sp>
+      <p:sp>
+        <p:nvSpPr>
+          <p:cNvPr id="34819" name="Rectangle 2"/>
+          <p:cNvSpPr>
+            <a:spLocks noGrp="1" noChangeArrowheads="1"/>
+          </p:cNvSpPr>
+          <p:nvPr>
+            <p:ph type="title"/>
+          </p:nvPr>
+        </p:nvSpPr>
+        <p:spPr/>
+        <p:txBody>
+          <a:bodyPr/>
+          <a:lstStyle/>
+          <a:p>
+            <a:r>
+              <a:rPr lang="en-US" sz="5400" dirty="0" smtClean="0"/>
+              <a:t>Team Problems</a:t>
+            </a:r>
+          </a:p>
+        </p:txBody>
+      </p:sp>
+      <p:sp>
+        <p:nvSpPr>
+          <p:cNvPr id="34820" name="Rectangle 3"/>
+          <p:cNvSpPr>
+            <a:spLocks noGrp="1" noChangeArrowheads="1"/>
+          </p:cNvSpPr>
+          <p:nvPr>
+            <p:ph type="body" idx="1"/>
+          </p:nvPr>
+        </p:nvSpPr>
+        <p:spPr>
+          <a:xfrm>
+            <a:off x="685800" y="1536700"/>
+            <a:ext cx="7708900" cy="3821113"/>
+          </a:xfrm>
+        </p:spPr>
+        <p:txBody>
+          <a:bodyPr/>
+          <a:lstStyle/>
+          <a:p>
+            <a:pPr algn="ctr">
+              <a:buFontTx/>
+              <a:buNone/>
+            </a:pPr>
+            <a:r>
+              <a:rPr lang="en-US" sz="10600" dirty="0" smtClean="0"/>
+              <a:t>Problems</a:t>
+            </a:r>
+          </a:p>
+          <a:p>
+            <a:pPr algn="ctr">
+              <a:buFontTx/>
+              <a:buNone/>
+            </a:pPr>
+            <a:r>
+              <a:rPr lang="en-US" sz="9600" dirty="0" smtClean="0"/>
+              <a:t>1</a:t>
+            </a:r>
+            <a:r>
+              <a:rPr lang="en-US" sz="9600" b="1" dirty="0" smtClean="0">
+                <a:latin typeface="Euclid Symbol" charset="2"/>
+                <a:cs typeface="Euclid Symbol" charset="2"/>
+              </a:rPr>
+              <a:t>–</a:t>
+            </a:r>
+            <a:r>
+              <a:rPr lang="en-US" sz="9600" dirty="0" smtClean="0"/>
+              <a:t>3</a:t>
+            </a:r>
+          </a:p>
+        </p:txBody>
+      </p:sp>
+    </p:spTree>
+  </p:cSld>
+  <p:clrMapOvr>
+    <a:masterClrMapping/>
+  </p:clrMapOvr>
+  <p:transition xmlns:p14="http://schemas.microsoft.com/office/powerpoint/2010/main">
+    <p:fade/>
+  </p:transition>
+  <p:timing>
+    <p:tnLst>
+      <p:par>
+        <p:cTn xmlns:p14="http://schemas.microsoft.com/office/powerpoint/2010/main" id="1" dur="indefinite" restart="never" nodeType="tmRoot"/>
+      </p:par>
+    </p:tnLst>
+  </p:timing>
+</p:sld>
+</file>
+
+<file path=ppt/slides/slide32.xml><?xml version="1.0" encoding="utf-8"?>
+<p:sld xmlns:a="http://schemas.openxmlformats.org/drawingml/2006/main" xmlns:r="http://schemas.openxmlformats.org/officeDocument/2006/relationships" xmlns:p="http://schemas.openxmlformats.org/presentationml/2006/main">
+  <p:cSld>
+    <p:spTree>
+      <p:nvGrpSpPr>
+        <p:cNvPr id="1" name=""/>
+        <p:cNvGrpSpPr/>
+        <p:nvPr/>
+      </p:nvGrpSpPr>
+      <p:grpSpPr>
+        <a:xfrm>
+          <a:off x="0" y="0"/>
+          <a:ext cx="0" cy="0"/>
+          <a:chOff x="0" y="0"/>
+          <a:chExt cx="0" cy="0"/>
+        </a:xfrm>
+      </p:grpSpPr>
+      <p:sp>
+        <p:nvSpPr>
           <p:cNvPr id="2" name="Title 1"/>
           <p:cNvSpPr>
             <a:spLocks noGrp="1"/>
@@ -21608,7 +22581,7 @@
               <a:pPr>
                 <a:defRPr/>
               </a:pPr>
-              <a:t>31</a:t>
+              <a:t>32</a:t>
             </a:fld>
             <a:endParaRPr lang="en-US" sz="1200"/>
           </a:p>
@@ -23033,7 +24006,7 @@
           <a:graphicData uri="http://schemas.openxmlformats.org/presentationml/2006/ole">
             <mc:AlternateContent xmlns:mc="http://schemas.openxmlformats.org/markup-compatibility/2006">
               <mc:Choice xmlns:v="urn:schemas-microsoft-com:vml" Requires="v">
-                <p:oleObj spid="_x0000_s3107" name="Equation" r:id="rId5" imgW="914400" imgH="215640" progId="Equation.3">
+                <p:oleObj spid="_x0000_s3112" name="Equation" r:id="rId5" imgW="914400" imgH="215640" progId="Equation.3">
                   <p:embed/>
                 </p:oleObj>
               </mc:Choice>
@@ -23103,7 +24076,7 @@
           <a:graphicData uri="http://schemas.openxmlformats.org/presentationml/2006/ole">
             <mc:AlternateContent xmlns:mc="http://schemas.openxmlformats.org/markup-compatibility/2006">
               <mc:Choice xmlns:v="urn:schemas-microsoft-com:vml" Requires="v">
-                <p:oleObj spid="_x0000_s3108" name="Equation" r:id="rId7" imgW="914400" imgH="215640" progId="Equation.3">
+                <p:oleObj spid="_x0000_s3113" name="Equation" r:id="rId7" imgW="914400" imgH="215640" progId="Equation.3">
                   <p:embed/>
                 </p:oleObj>
               </mc:Choice>

</xml_diff>